<commit_message>
boxplots of TRN genes
</commit_message>
<xml_diff>
--- a/manuscript/manuscript_figures/mPFC_manuscript_figures.pptx
+++ b/manuscript/manuscript_figures/mPFC_manuscript_figures.pptx
@@ -5,19 +5,21 @@
     <p:sldMasterId id="2147483648" r:id="rId1"/>
   </p:sldMasterIdLst>
   <p:notesMasterIdLst>
-    <p:notesMasterId r:id="rId12"/>
+    <p:notesMasterId r:id="rId14"/>
   </p:notesMasterIdLst>
   <p:sldIdLst>
     <p:sldId id="256" r:id="rId2"/>
     <p:sldId id="257" r:id="rId3"/>
-    <p:sldId id="260" r:id="rId4"/>
-    <p:sldId id="258" r:id="rId5"/>
-    <p:sldId id="264" r:id="rId6"/>
-    <p:sldId id="265" r:id="rId7"/>
-    <p:sldId id="259" r:id="rId8"/>
-    <p:sldId id="263" r:id="rId9"/>
-    <p:sldId id="261" r:id="rId10"/>
-    <p:sldId id="262" r:id="rId11"/>
+    <p:sldId id="266" r:id="rId4"/>
+    <p:sldId id="260" r:id="rId5"/>
+    <p:sldId id="258" r:id="rId6"/>
+    <p:sldId id="264" r:id="rId7"/>
+    <p:sldId id="265" r:id="rId8"/>
+    <p:sldId id="259" r:id="rId9"/>
+    <p:sldId id="263" r:id="rId10"/>
+    <p:sldId id="267" r:id="rId11"/>
+    <p:sldId id="261" r:id="rId12"/>
+    <p:sldId id="262" r:id="rId13"/>
   </p:sldIdLst>
   <p:sldSz cx="12192000" cy="6858000"/>
   <p:notesSz cx="6858000" cy="9144000"/>
@@ -129,7 +131,7 @@
   <pc:docChgLst>
     <pc:chgData name="Tyler Milewski" userId="d8a66fee8314b92f" providerId="LiveId" clId="{C84B92C0-0BEA-4C39-9B74-17E8D7BEDFB3}"/>
     <pc:docChg chg="undo redo custSel addSld delSld modSld sldOrd">
-      <pc:chgData name="Tyler Milewski" userId="d8a66fee8314b92f" providerId="LiveId" clId="{C84B92C0-0BEA-4C39-9B74-17E8D7BEDFB3}" dt="2023-12-09T21:33:25.394" v="1815" actId="1035"/>
+      <pc:chgData name="Tyler Milewski" userId="d8a66fee8314b92f" providerId="LiveId" clId="{C84B92C0-0BEA-4C39-9B74-17E8D7BEDFB3}" dt="2023-12-16T17:43:08.175" v="1904" actId="478"/>
       <pc:docMkLst>
         <pc:docMk/>
       </pc:docMkLst>
@@ -2117,6 +2119,164 @@
           </ac:cxnSpMkLst>
         </pc:cxnChg>
       </pc:sldChg>
+      <pc:sldChg chg="delSp modSp add mod">
+        <pc:chgData name="Tyler Milewski" userId="d8a66fee8314b92f" providerId="LiveId" clId="{C84B92C0-0BEA-4C39-9B74-17E8D7BEDFB3}" dt="2023-12-16T16:31:56.470" v="1898" actId="403"/>
+        <pc:sldMkLst>
+          <pc:docMk/>
+          <pc:sldMk cId="3029619570" sldId="266"/>
+        </pc:sldMkLst>
+        <pc:spChg chg="mod">
+          <ac:chgData name="Tyler Milewski" userId="d8a66fee8314b92f" providerId="LiveId" clId="{C84B92C0-0BEA-4C39-9B74-17E8D7BEDFB3}" dt="2023-12-16T16:31:50.884" v="1896" actId="403"/>
+          <ac:spMkLst>
+            <pc:docMk/>
+            <pc:sldMk cId="3029619570" sldId="266"/>
+            <ac:spMk id="2" creationId="{60B70F63-9CEC-19BA-0CAE-3B97184798BD}"/>
+          </ac:spMkLst>
+        </pc:spChg>
+        <pc:spChg chg="mod">
+          <ac:chgData name="Tyler Milewski" userId="d8a66fee8314b92f" providerId="LiveId" clId="{C84B92C0-0BEA-4C39-9B74-17E8D7BEDFB3}" dt="2023-12-16T16:31:54.044" v="1897" actId="403"/>
+          <ac:spMkLst>
+            <pc:docMk/>
+            <pc:sldMk cId="3029619570" sldId="266"/>
+            <ac:spMk id="3" creationId="{50C90845-3A6B-0CF9-C868-2D606D50F2E6}"/>
+          </ac:spMkLst>
+        </pc:spChg>
+        <pc:spChg chg="mod">
+          <ac:chgData name="Tyler Milewski" userId="d8a66fee8314b92f" providerId="LiveId" clId="{C84B92C0-0BEA-4C39-9B74-17E8D7BEDFB3}" dt="2023-12-16T16:31:32.335" v="1892" actId="1076"/>
+          <ac:spMkLst>
+            <pc:docMk/>
+            <pc:sldMk cId="3029619570" sldId="266"/>
+            <ac:spMk id="11" creationId="{C6A89425-2AA4-C5E1-98C2-2C1DFE35A901}"/>
+          </ac:spMkLst>
+        </pc:spChg>
+        <pc:spChg chg="mod">
+          <ac:chgData name="Tyler Milewski" userId="d8a66fee8314b92f" providerId="LiveId" clId="{C84B92C0-0BEA-4C39-9B74-17E8D7BEDFB3}" dt="2023-12-16T16:31:17.320" v="1891" actId="1076"/>
+          <ac:spMkLst>
+            <pc:docMk/>
+            <pc:sldMk cId="3029619570" sldId="266"/>
+            <ac:spMk id="15" creationId="{64A3A719-E98A-4504-9C18-AC10B2A9FA85}"/>
+          </ac:spMkLst>
+        </pc:spChg>
+        <pc:spChg chg="del">
+          <ac:chgData name="Tyler Milewski" userId="d8a66fee8314b92f" providerId="LiveId" clId="{C84B92C0-0BEA-4C39-9B74-17E8D7BEDFB3}" dt="2023-12-16T16:21:34.804" v="1817" actId="478"/>
+          <ac:spMkLst>
+            <pc:docMk/>
+            <pc:sldMk cId="3029619570" sldId="266"/>
+            <ac:spMk id="19" creationId="{6245E31E-8A01-4216-AB7F-FFEAA826839C}"/>
+          </ac:spMkLst>
+        </pc:spChg>
+        <pc:spChg chg="mod">
+          <ac:chgData name="Tyler Milewski" userId="d8a66fee8314b92f" providerId="LiveId" clId="{C84B92C0-0BEA-4C39-9B74-17E8D7BEDFB3}" dt="2023-12-16T16:31:56.470" v="1898" actId="403"/>
+          <ac:spMkLst>
+            <pc:docMk/>
+            <pc:sldMk cId="3029619570" sldId="266"/>
+            <ac:spMk id="33" creationId="{04D538CE-BC48-F4C6-3D31-735F2ED2AE07}"/>
+          </ac:spMkLst>
+        </pc:spChg>
+        <pc:graphicFrameChg chg="mod modGraphic">
+          <ac:chgData name="Tyler Milewski" userId="d8a66fee8314b92f" providerId="LiveId" clId="{C84B92C0-0BEA-4C39-9B74-17E8D7BEDFB3}" dt="2023-12-16T16:29:38.288" v="1870" actId="1076"/>
+          <ac:graphicFrameMkLst>
+            <pc:docMk/>
+            <pc:sldMk cId="3029619570" sldId="266"/>
+            <ac:graphicFrameMk id="4" creationId="{3A159B57-23BD-9E18-9098-D28C3567E37D}"/>
+          </ac:graphicFrameMkLst>
+        </pc:graphicFrameChg>
+        <pc:graphicFrameChg chg="mod modGraphic">
+          <ac:chgData name="Tyler Milewski" userId="d8a66fee8314b92f" providerId="LiveId" clId="{C84B92C0-0BEA-4C39-9B74-17E8D7BEDFB3}" dt="2023-12-16T16:29:33.005" v="1868" actId="1076"/>
+          <ac:graphicFrameMkLst>
+            <pc:docMk/>
+            <pc:sldMk cId="3029619570" sldId="266"/>
+            <ac:graphicFrameMk id="9" creationId="{FAAEDF3D-DC7E-D0E2-ADF9-C960DC5AD9AE}"/>
+          </ac:graphicFrameMkLst>
+        </pc:graphicFrameChg>
+        <pc:graphicFrameChg chg="mod modGraphic">
+          <ac:chgData name="Tyler Milewski" userId="d8a66fee8314b92f" providerId="LiveId" clId="{C84B92C0-0BEA-4C39-9B74-17E8D7BEDFB3}" dt="2023-12-16T16:29:44.442" v="1871" actId="1076"/>
+          <ac:graphicFrameMkLst>
+            <pc:docMk/>
+            <pc:sldMk cId="3029619570" sldId="266"/>
+            <ac:graphicFrameMk id="10" creationId="{94992ABF-BCA6-1B01-BF07-0CC8A573BC07}"/>
+          </ac:graphicFrameMkLst>
+        </pc:graphicFrameChg>
+        <pc:graphicFrameChg chg="mod modGraphic">
+          <ac:chgData name="Tyler Milewski" userId="d8a66fee8314b92f" providerId="LiveId" clId="{C84B92C0-0BEA-4C39-9B74-17E8D7BEDFB3}" dt="2023-12-16T16:30:26.271" v="1878"/>
+          <ac:graphicFrameMkLst>
+            <pc:docMk/>
+            <pc:sldMk cId="3029619570" sldId="266"/>
+            <ac:graphicFrameMk id="12" creationId="{FE461BB6-4C08-1802-819E-4E2711294760}"/>
+          </ac:graphicFrameMkLst>
+        </pc:graphicFrameChg>
+        <pc:graphicFrameChg chg="mod modGraphic">
+          <ac:chgData name="Tyler Milewski" userId="d8a66fee8314b92f" providerId="LiveId" clId="{C84B92C0-0BEA-4C39-9B74-17E8D7BEDFB3}" dt="2023-12-16T16:30:11.319" v="1874" actId="1076"/>
+          <ac:graphicFrameMkLst>
+            <pc:docMk/>
+            <pc:sldMk cId="3029619570" sldId="266"/>
+            <ac:graphicFrameMk id="13" creationId="{956E8830-682E-327C-3D5A-676E0A96FC00}"/>
+          </ac:graphicFrameMkLst>
+        </pc:graphicFrameChg>
+        <pc:graphicFrameChg chg="mod modGraphic">
+          <ac:chgData name="Tyler Milewski" userId="d8a66fee8314b92f" providerId="LiveId" clId="{C84B92C0-0BEA-4C39-9B74-17E8D7BEDFB3}" dt="2023-12-16T16:30:50.927" v="1884" actId="1076"/>
+          <ac:graphicFrameMkLst>
+            <pc:docMk/>
+            <pc:sldMk cId="3029619570" sldId="266"/>
+            <ac:graphicFrameMk id="14" creationId="{970A1E2D-4E4D-C1A8-9270-65ABC5FEB608}"/>
+          </ac:graphicFrameMkLst>
+        </pc:graphicFrameChg>
+        <pc:graphicFrameChg chg="del">
+          <ac:chgData name="Tyler Milewski" userId="d8a66fee8314b92f" providerId="LiveId" clId="{C84B92C0-0BEA-4C39-9B74-17E8D7BEDFB3}" dt="2023-12-16T16:21:34.804" v="1817" actId="478"/>
+          <ac:graphicFrameMkLst>
+            <pc:docMk/>
+            <pc:sldMk cId="3029619570" sldId="266"/>
+            <ac:graphicFrameMk id="16" creationId="{A9F9CB54-3E00-9BD6-95FB-9FC51C036C15}"/>
+          </ac:graphicFrameMkLst>
+        </pc:graphicFrameChg>
+        <pc:graphicFrameChg chg="del">
+          <ac:chgData name="Tyler Milewski" userId="d8a66fee8314b92f" providerId="LiveId" clId="{C84B92C0-0BEA-4C39-9B74-17E8D7BEDFB3}" dt="2023-12-16T16:21:34.804" v="1817" actId="478"/>
+          <ac:graphicFrameMkLst>
+            <pc:docMk/>
+            <pc:sldMk cId="3029619570" sldId="266"/>
+            <ac:graphicFrameMk id="17" creationId="{C5D798A4-0836-125E-2243-667F76662014}"/>
+          </ac:graphicFrameMkLst>
+        </pc:graphicFrameChg>
+        <pc:graphicFrameChg chg="del">
+          <ac:chgData name="Tyler Milewski" userId="d8a66fee8314b92f" providerId="LiveId" clId="{C84B92C0-0BEA-4C39-9B74-17E8D7BEDFB3}" dt="2023-12-16T16:21:34.804" v="1817" actId="478"/>
+          <ac:graphicFrameMkLst>
+            <pc:docMk/>
+            <pc:sldMk cId="3029619570" sldId="266"/>
+            <ac:graphicFrameMk id="18" creationId="{8D9320DB-B5CC-4A69-EC3E-EE97C1DAAA20}"/>
+          </ac:graphicFrameMkLst>
+        </pc:graphicFrameChg>
+      </pc:sldChg>
+      <pc:sldChg chg="addSp delSp modSp new mod">
+        <pc:chgData name="Tyler Milewski" userId="d8a66fee8314b92f" providerId="LiveId" clId="{C84B92C0-0BEA-4C39-9B74-17E8D7BEDFB3}" dt="2023-12-16T17:43:08.175" v="1904" actId="478"/>
+        <pc:sldMkLst>
+          <pc:docMk/>
+          <pc:sldMk cId="3708415234" sldId="267"/>
+        </pc:sldMkLst>
+        <pc:spChg chg="del">
+          <ac:chgData name="Tyler Milewski" userId="d8a66fee8314b92f" providerId="LiveId" clId="{C84B92C0-0BEA-4C39-9B74-17E8D7BEDFB3}" dt="2023-12-16T16:58:17.110" v="1900" actId="478"/>
+          <ac:spMkLst>
+            <pc:docMk/>
+            <pc:sldMk cId="3708415234" sldId="267"/>
+            <ac:spMk id="2" creationId="{0662081C-6DA7-80E6-DF74-F2AACC4F757F}"/>
+          </ac:spMkLst>
+        </pc:spChg>
+        <pc:spChg chg="del">
+          <ac:chgData name="Tyler Milewski" userId="d8a66fee8314b92f" providerId="LiveId" clId="{C84B92C0-0BEA-4C39-9B74-17E8D7BEDFB3}" dt="2023-12-16T16:58:17.110" v="1900" actId="478"/>
+          <ac:spMkLst>
+            <pc:docMk/>
+            <pc:sldMk cId="3708415234" sldId="267"/>
+            <ac:spMk id="3" creationId="{3F042DA2-3245-5E25-AFAD-B7FF1FC8956B}"/>
+          </ac:spMkLst>
+        </pc:spChg>
+        <pc:picChg chg="add del mod">
+          <ac:chgData name="Tyler Milewski" userId="d8a66fee8314b92f" providerId="LiveId" clId="{C84B92C0-0BEA-4C39-9B74-17E8D7BEDFB3}" dt="2023-12-16T17:43:08.175" v="1904" actId="478"/>
+          <ac:picMkLst>
+            <pc:docMk/>
+            <pc:sldMk cId="3708415234" sldId="267"/>
+            <ac:picMk id="4" creationId="{D7D9E03F-4C0F-A501-21D7-8F22D2ED3EEC}"/>
+          </ac:picMkLst>
+        </pc:picChg>
+      </pc:sldChg>
     </pc:docChg>
   </pc:docChgLst>
 </pc:chgInfo>
@@ -2204,7 +2364,7 @@
           <a:p>
             <a:fld id="{A5455D89-EC58-400D-B0F7-643E06BB23AE}" type="datetimeFigureOut">
               <a:rPr lang="en-US" smtClean="0"/>
-              <a:t>12/7/2023</a:t>
+              <a:t>12/16/2023</a:t>
             </a:fld>
             <a:endParaRPr lang="en-US"/>
           </a:p>
@@ -2618,6 +2778,107 @@
           <a:p>
             <a:r>
               <a:rPr lang="en-US" dirty="0"/>
+              <a:t>Up in TRN vs SUB: Ugt8a, </a:t>
+            </a:r>
+            <a:r>
+              <a:rPr lang="en-US" dirty="0" err="1"/>
+              <a:t>Mobp</a:t>
+            </a:r>
+            <a:r>
+              <a:rPr lang="en-US" dirty="0"/>
+              <a:t> </a:t>
+            </a:r>
+          </a:p>
+          <a:p>
+            <a:r>
+              <a:rPr lang="en-US" dirty="0"/>
+              <a:t>Down in TRN vs SUB: Magi3, Ift122, Zbtb46, Cdc42ep3 </a:t>
+            </a:r>
+          </a:p>
+        </p:txBody>
+      </p:sp>
+      <p:sp>
+        <p:nvSpPr>
+          <p:cNvPr id="4" name="Slide Number Placeholder 3"/>
+          <p:cNvSpPr>
+            <a:spLocks noGrp="1"/>
+          </p:cNvSpPr>
+          <p:nvPr>
+            <p:ph type="sldNum" sz="quarter" idx="5"/>
+          </p:nvPr>
+        </p:nvSpPr>
+        <p:spPr/>
+        <p:txBody>
+          <a:bodyPr/>
+          <a:lstStyle/>
+          <a:p>
+            <a:fld id="{6C451176-B052-47BC-AA7C-02ADF439AF37}" type="slidenum">
+              <a:rPr lang="en-US" smtClean="0"/>
+              <a:t>3</a:t>
+            </a:fld>
+            <a:endParaRPr lang="en-US"/>
+          </a:p>
+        </p:txBody>
+      </p:sp>
+    </p:spTree>
+    <p:extLst>
+      <p:ext uri="{BB962C8B-B14F-4D97-AF65-F5344CB8AC3E}">
+        <p14:creationId xmlns:p14="http://schemas.microsoft.com/office/powerpoint/2010/main" val="235193028"/>
+      </p:ext>
+    </p:extLst>
+  </p:cSld>
+  <p:clrMapOvr>
+    <a:masterClrMapping/>
+  </p:clrMapOvr>
+</p:notes>
+</file>
+
+<file path=ppt/notesSlides/notesSlide3.xml><?xml version="1.0" encoding="utf-8"?>
+<p:notes xmlns:a="http://schemas.openxmlformats.org/drawingml/2006/main" xmlns:r="http://schemas.openxmlformats.org/officeDocument/2006/relationships" xmlns:p="http://schemas.openxmlformats.org/presentationml/2006/main">
+  <p:cSld>
+    <p:spTree>
+      <p:nvGrpSpPr>
+        <p:cNvPr id="1" name=""/>
+        <p:cNvGrpSpPr/>
+        <p:nvPr/>
+      </p:nvGrpSpPr>
+      <p:grpSpPr>
+        <a:xfrm>
+          <a:off x="0" y="0"/>
+          <a:ext cx="0" cy="0"/>
+          <a:chOff x="0" y="0"/>
+          <a:chExt cx="0" cy="0"/>
+        </a:xfrm>
+      </p:grpSpPr>
+      <p:sp>
+        <p:nvSpPr>
+          <p:cNvPr id="2" name="Slide Image Placeholder 1"/>
+          <p:cNvSpPr>
+            <a:spLocks noGrp="1" noRot="1" noChangeAspect="1"/>
+          </p:cNvSpPr>
+          <p:nvPr>
+            <p:ph type="sldImg"/>
+          </p:nvPr>
+        </p:nvSpPr>
+        <p:spPr/>
+      </p:sp>
+      <p:sp>
+        <p:nvSpPr>
+          <p:cNvPr id="3" name="Notes Placeholder 2"/>
+          <p:cNvSpPr>
+            <a:spLocks noGrp="1"/>
+          </p:cNvSpPr>
+          <p:nvPr>
+            <p:ph type="body" idx="1"/>
+          </p:nvPr>
+        </p:nvSpPr>
+        <p:spPr/>
+        <p:txBody>
+          <a:bodyPr/>
+          <a:lstStyle/>
+          <a:p>
+            <a:r>
+              <a:rPr lang="en-US" dirty="0"/>
               <a:t>DES vs stable in both time points </a:t>
             </a:r>
           </a:p>
@@ -2742,7 +3003,7 @@
           <a:p>
             <a:fld id="{6C451176-B052-47BC-AA7C-02ADF439AF37}" type="slidenum">
               <a:rPr lang="en-US" smtClean="0"/>
-              <a:t>3</a:t>
+              <a:t>4</a:t>
             </a:fld>
             <a:endParaRPr lang="en-US"/>
           </a:p>
@@ -2752,90 +3013,6 @@
     <p:extLst>
       <p:ext uri="{BB962C8B-B14F-4D97-AF65-F5344CB8AC3E}">
         <p14:creationId xmlns:p14="http://schemas.microsoft.com/office/powerpoint/2010/main" val="3791466188"/>
-      </p:ext>
-    </p:extLst>
-  </p:cSld>
-  <p:clrMapOvr>
-    <a:masterClrMapping/>
-  </p:clrMapOvr>
-</p:notes>
-</file>
-
-<file path=ppt/notesSlides/notesSlide3.xml><?xml version="1.0" encoding="utf-8"?>
-<p:notes xmlns:a="http://schemas.openxmlformats.org/drawingml/2006/main" xmlns:r="http://schemas.openxmlformats.org/officeDocument/2006/relationships" xmlns:p="http://schemas.openxmlformats.org/presentationml/2006/main">
-  <p:cSld>
-    <p:spTree>
-      <p:nvGrpSpPr>
-        <p:cNvPr id="1" name=""/>
-        <p:cNvGrpSpPr/>
-        <p:nvPr/>
-      </p:nvGrpSpPr>
-      <p:grpSpPr>
-        <a:xfrm>
-          <a:off x="0" y="0"/>
-          <a:ext cx="0" cy="0"/>
-          <a:chOff x="0" y="0"/>
-          <a:chExt cx="0" cy="0"/>
-        </a:xfrm>
-      </p:grpSpPr>
-      <p:sp>
-        <p:nvSpPr>
-          <p:cNvPr id="2" name="Slide Image Placeholder 1"/>
-          <p:cNvSpPr>
-            <a:spLocks noGrp="1" noRot="1" noChangeAspect="1"/>
-          </p:cNvSpPr>
-          <p:nvPr>
-            <p:ph type="sldImg"/>
-          </p:nvPr>
-        </p:nvSpPr>
-        <p:spPr/>
-      </p:sp>
-      <p:sp>
-        <p:nvSpPr>
-          <p:cNvPr id="3" name="Notes Placeholder 2"/>
-          <p:cNvSpPr>
-            <a:spLocks noGrp="1"/>
-          </p:cNvSpPr>
-          <p:nvPr>
-            <p:ph type="body" idx="1"/>
-          </p:nvPr>
-        </p:nvSpPr>
-        <p:spPr/>
-        <p:txBody>
-          <a:bodyPr/>
-          <a:lstStyle/>
-          <a:p>
-            <a:endParaRPr lang="en-US" dirty="0"/>
-          </a:p>
-        </p:txBody>
-      </p:sp>
-      <p:sp>
-        <p:nvSpPr>
-          <p:cNvPr id="4" name="Slide Number Placeholder 3"/>
-          <p:cNvSpPr>
-            <a:spLocks noGrp="1"/>
-          </p:cNvSpPr>
-          <p:nvPr>
-            <p:ph type="sldNum" sz="quarter" idx="5"/>
-          </p:nvPr>
-        </p:nvSpPr>
-        <p:spPr/>
-        <p:txBody>
-          <a:bodyPr/>
-          <a:lstStyle/>
-          <a:p>
-            <a:fld id="{6C451176-B052-47BC-AA7C-02ADF439AF37}" type="slidenum">
-              <a:rPr lang="en-US" smtClean="0"/>
-              <a:t>5</a:t>
-            </a:fld>
-            <a:endParaRPr lang="en-US"/>
-          </a:p>
-        </p:txBody>
-      </p:sp>
-    </p:spTree>
-    <p:extLst>
-      <p:ext uri="{BB962C8B-B14F-4D97-AF65-F5344CB8AC3E}">
-        <p14:creationId xmlns:p14="http://schemas.microsoft.com/office/powerpoint/2010/main" val="1336706587"/>
       </p:ext>
     </p:extLst>
   </p:cSld>
@@ -2911,6 +3088,90 @@
             <a:fld id="{6C451176-B052-47BC-AA7C-02ADF439AF37}" type="slidenum">
               <a:rPr lang="en-US" smtClean="0"/>
               <a:t>6</a:t>
+            </a:fld>
+            <a:endParaRPr lang="en-US"/>
+          </a:p>
+        </p:txBody>
+      </p:sp>
+    </p:spTree>
+    <p:extLst>
+      <p:ext uri="{BB962C8B-B14F-4D97-AF65-F5344CB8AC3E}">
+        <p14:creationId xmlns:p14="http://schemas.microsoft.com/office/powerpoint/2010/main" val="1336706587"/>
+      </p:ext>
+    </p:extLst>
+  </p:cSld>
+  <p:clrMapOvr>
+    <a:masterClrMapping/>
+  </p:clrMapOvr>
+</p:notes>
+</file>
+
+<file path=ppt/notesSlides/notesSlide5.xml><?xml version="1.0" encoding="utf-8"?>
+<p:notes xmlns:a="http://schemas.openxmlformats.org/drawingml/2006/main" xmlns:r="http://schemas.openxmlformats.org/officeDocument/2006/relationships" xmlns:p="http://schemas.openxmlformats.org/presentationml/2006/main">
+  <p:cSld>
+    <p:spTree>
+      <p:nvGrpSpPr>
+        <p:cNvPr id="1" name=""/>
+        <p:cNvGrpSpPr/>
+        <p:nvPr/>
+      </p:nvGrpSpPr>
+      <p:grpSpPr>
+        <a:xfrm>
+          <a:off x="0" y="0"/>
+          <a:ext cx="0" cy="0"/>
+          <a:chOff x="0" y="0"/>
+          <a:chExt cx="0" cy="0"/>
+        </a:xfrm>
+      </p:grpSpPr>
+      <p:sp>
+        <p:nvSpPr>
+          <p:cNvPr id="2" name="Slide Image Placeholder 1"/>
+          <p:cNvSpPr>
+            <a:spLocks noGrp="1" noRot="1" noChangeAspect="1"/>
+          </p:cNvSpPr>
+          <p:nvPr>
+            <p:ph type="sldImg"/>
+          </p:nvPr>
+        </p:nvSpPr>
+        <p:spPr/>
+      </p:sp>
+      <p:sp>
+        <p:nvSpPr>
+          <p:cNvPr id="3" name="Notes Placeholder 2"/>
+          <p:cNvSpPr>
+            <a:spLocks noGrp="1"/>
+          </p:cNvSpPr>
+          <p:nvPr>
+            <p:ph type="body" idx="1"/>
+          </p:nvPr>
+        </p:nvSpPr>
+        <p:spPr/>
+        <p:txBody>
+          <a:bodyPr/>
+          <a:lstStyle/>
+          <a:p>
+            <a:endParaRPr lang="en-US" dirty="0"/>
+          </a:p>
+        </p:txBody>
+      </p:sp>
+      <p:sp>
+        <p:nvSpPr>
+          <p:cNvPr id="4" name="Slide Number Placeholder 3"/>
+          <p:cNvSpPr>
+            <a:spLocks noGrp="1"/>
+          </p:cNvSpPr>
+          <p:nvPr>
+            <p:ph type="sldNum" sz="quarter" idx="5"/>
+          </p:nvPr>
+        </p:nvSpPr>
+        <p:spPr/>
+        <p:txBody>
+          <a:bodyPr/>
+          <a:lstStyle/>
+          <a:p>
+            <a:fld id="{6C451176-B052-47BC-AA7C-02ADF439AF37}" type="slidenum">
+              <a:rPr lang="en-US" smtClean="0"/>
+              <a:t>7</a:t>
             </a:fld>
             <a:endParaRPr lang="en-US"/>
           </a:p>
@@ -3076,7 +3337,7 @@
           <a:p>
             <a:fld id="{53284534-6838-424D-A0FD-02358E33BB30}" type="datetimeFigureOut">
               <a:rPr lang="en-US" smtClean="0"/>
-              <a:t>12/7/2023</a:t>
+              <a:t>12/16/2023</a:t>
             </a:fld>
             <a:endParaRPr lang="en-US"/>
           </a:p>
@@ -3274,7 +3535,7 @@
           <a:p>
             <a:fld id="{53284534-6838-424D-A0FD-02358E33BB30}" type="datetimeFigureOut">
               <a:rPr lang="en-US" smtClean="0"/>
-              <a:t>12/7/2023</a:t>
+              <a:t>12/16/2023</a:t>
             </a:fld>
             <a:endParaRPr lang="en-US"/>
           </a:p>
@@ -3482,7 +3743,7 @@
           <a:p>
             <a:fld id="{53284534-6838-424D-A0FD-02358E33BB30}" type="datetimeFigureOut">
               <a:rPr lang="en-US" smtClean="0"/>
-              <a:t>12/7/2023</a:t>
+              <a:t>12/16/2023</a:t>
             </a:fld>
             <a:endParaRPr lang="en-US"/>
           </a:p>
@@ -3680,7 +3941,7 @@
           <a:p>
             <a:fld id="{53284534-6838-424D-A0FD-02358E33BB30}" type="datetimeFigureOut">
               <a:rPr lang="en-US" smtClean="0"/>
-              <a:t>12/7/2023</a:t>
+              <a:t>12/16/2023</a:t>
             </a:fld>
             <a:endParaRPr lang="en-US"/>
           </a:p>
@@ -3955,7 +4216,7 @@
           <a:p>
             <a:fld id="{53284534-6838-424D-A0FD-02358E33BB30}" type="datetimeFigureOut">
               <a:rPr lang="en-US" smtClean="0"/>
-              <a:t>12/7/2023</a:t>
+              <a:t>12/16/2023</a:t>
             </a:fld>
             <a:endParaRPr lang="en-US"/>
           </a:p>
@@ -4220,7 +4481,7 @@
           <a:p>
             <a:fld id="{53284534-6838-424D-A0FD-02358E33BB30}" type="datetimeFigureOut">
               <a:rPr lang="en-US" smtClean="0"/>
-              <a:t>12/7/2023</a:t>
+              <a:t>12/16/2023</a:t>
             </a:fld>
             <a:endParaRPr lang="en-US"/>
           </a:p>
@@ -4632,7 +4893,7 @@
           <a:p>
             <a:fld id="{53284534-6838-424D-A0FD-02358E33BB30}" type="datetimeFigureOut">
               <a:rPr lang="en-US" smtClean="0"/>
-              <a:t>12/7/2023</a:t>
+              <a:t>12/16/2023</a:t>
             </a:fld>
             <a:endParaRPr lang="en-US"/>
           </a:p>
@@ -4773,7 +5034,7 @@
           <a:p>
             <a:fld id="{53284534-6838-424D-A0FD-02358E33BB30}" type="datetimeFigureOut">
               <a:rPr lang="en-US" smtClean="0"/>
-              <a:t>12/7/2023</a:t>
+              <a:t>12/16/2023</a:t>
             </a:fld>
             <a:endParaRPr lang="en-US"/>
           </a:p>
@@ -4886,7 +5147,7 @@
           <a:p>
             <a:fld id="{53284534-6838-424D-A0FD-02358E33BB30}" type="datetimeFigureOut">
               <a:rPr lang="en-US" smtClean="0"/>
-              <a:t>12/7/2023</a:t>
+              <a:t>12/16/2023</a:t>
             </a:fld>
             <a:endParaRPr lang="en-US"/>
           </a:p>
@@ -5197,7 +5458,7 @@
           <a:p>
             <a:fld id="{53284534-6838-424D-A0FD-02358E33BB30}" type="datetimeFigureOut">
               <a:rPr lang="en-US" smtClean="0"/>
-              <a:t>12/7/2023</a:t>
+              <a:t>12/16/2023</a:t>
             </a:fld>
             <a:endParaRPr lang="en-US"/>
           </a:p>
@@ -5485,7 +5746,7 @@
           <a:p>
             <a:fld id="{53284534-6838-424D-A0FD-02358E33BB30}" type="datetimeFigureOut">
               <a:rPr lang="en-US" smtClean="0"/>
-              <a:t>12/7/2023</a:t>
+              <a:t>12/16/2023</a:t>
             </a:fld>
             <a:endParaRPr lang="en-US"/>
           </a:p>
@@ -5726,7 +5987,7 @@
           <a:p>
             <a:fld id="{53284534-6838-424D-A0FD-02358E33BB30}" type="datetimeFigureOut">
               <a:rPr lang="en-US" smtClean="0"/>
-              <a:t>12/7/2023</a:t>
+              <a:t>12/16/2023</a:t>
             </a:fld>
             <a:endParaRPr lang="en-US"/>
           </a:p>
@@ -16291,6 +16552,186 @@
           <a:chExt cx="0" cy="0"/>
         </a:xfrm>
       </p:grpSpPr>
+    </p:spTree>
+    <p:extLst>
+      <p:ext uri="{BB962C8B-B14F-4D97-AF65-F5344CB8AC3E}">
+        <p14:creationId xmlns:p14="http://schemas.microsoft.com/office/powerpoint/2010/main" val="3708415234"/>
+      </p:ext>
+    </p:extLst>
+  </p:cSld>
+  <p:clrMapOvr>
+    <a:masterClrMapping/>
+  </p:clrMapOvr>
+</p:sld>
+</file>
+
+<file path=ppt/slides/slide11.xml><?xml version="1.0" encoding="utf-8"?>
+<p:sld xmlns:a="http://schemas.openxmlformats.org/drawingml/2006/main" xmlns:r="http://schemas.openxmlformats.org/officeDocument/2006/relationships" xmlns:p="http://schemas.openxmlformats.org/presentationml/2006/main">
+  <p:cSld>
+    <p:spTree>
+      <p:nvGrpSpPr>
+        <p:cNvPr id="1" name=""/>
+        <p:cNvGrpSpPr/>
+        <p:nvPr/>
+      </p:nvGrpSpPr>
+      <p:grpSpPr>
+        <a:xfrm>
+          <a:off x="0" y="0"/>
+          <a:ext cx="0" cy="0"/>
+          <a:chOff x="0" y="0"/>
+          <a:chExt cx="0" cy="0"/>
+        </a:xfrm>
+      </p:grpSpPr>
+      <p:pic>
+        <p:nvPicPr>
+          <p:cNvPr id="5" name="Picture 4">
+            <a:extLst>
+              <a:ext uri="{FF2B5EF4-FFF2-40B4-BE49-F238E27FC236}">
+                <a16:creationId xmlns:a16="http://schemas.microsoft.com/office/drawing/2014/main" id="{5C3CDE7C-D47B-54FB-1B5C-90EA54328053}"/>
+              </a:ext>
+            </a:extLst>
+          </p:cNvPr>
+          <p:cNvPicPr>
+            <a:picLocks noChangeAspect="1"/>
+          </p:cNvPicPr>
+          <p:nvPr/>
+        </p:nvPicPr>
+        <p:blipFill>
+          <a:blip r:embed="rId2"/>
+          <a:stretch>
+            <a:fillRect/>
+          </a:stretch>
+        </p:blipFill>
+        <p:spPr>
+          <a:xfrm>
+            <a:off x="158679" y="166952"/>
+            <a:ext cx="5724825" cy="2806286"/>
+          </a:xfrm>
+          <a:prstGeom prst="rect">
+            <a:avLst/>
+          </a:prstGeom>
+        </p:spPr>
+      </p:pic>
+      <p:pic>
+        <p:nvPicPr>
+          <p:cNvPr id="7" name="Picture 6">
+            <a:extLst>
+              <a:ext uri="{FF2B5EF4-FFF2-40B4-BE49-F238E27FC236}">
+                <a16:creationId xmlns:a16="http://schemas.microsoft.com/office/drawing/2014/main" id="{17F23580-988C-B076-F2FF-DC427D64F60C}"/>
+              </a:ext>
+            </a:extLst>
+          </p:cNvPr>
+          <p:cNvPicPr>
+            <a:picLocks noChangeAspect="1"/>
+          </p:cNvPicPr>
+          <p:nvPr/>
+        </p:nvPicPr>
+        <p:blipFill>
+          <a:blip r:embed="rId3"/>
+          <a:stretch>
+            <a:fillRect/>
+          </a:stretch>
+        </p:blipFill>
+        <p:spPr>
+          <a:xfrm>
+            <a:off x="6026989" y="17596"/>
+            <a:ext cx="5641675" cy="3006291"/>
+          </a:xfrm>
+          <a:prstGeom prst="rect">
+            <a:avLst/>
+          </a:prstGeom>
+        </p:spPr>
+      </p:pic>
+      <p:pic>
+        <p:nvPicPr>
+          <p:cNvPr id="9" name="Picture 8">
+            <a:extLst>
+              <a:ext uri="{FF2B5EF4-FFF2-40B4-BE49-F238E27FC236}">
+                <a16:creationId xmlns:a16="http://schemas.microsoft.com/office/drawing/2014/main" id="{7438ED5C-A187-EAC5-8886-3D6890D2ED96}"/>
+              </a:ext>
+            </a:extLst>
+          </p:cNvPr>
+          <p:cNvPicPr>
+            <a:picLocks noChangeAspect="1"/>
+          </p:cNvPicPr>
+          <p:nvPr/>
+        </p:nvPicPr>
+        <p:blipFill>
+          <a:blip r:embed="rId4"/>
+          <a:stretch>
+            <a:fillRect/>
+          </a:stretch>
+        </p:blipFill>
+        <p:spPr>
+          <a:xfrm>
+            <a:off x="196310" y="3429000"/>
+            <a:ext cx="5899690" cy="3059778"/>
+          </a:xfrm>
+          <a:prstGeom prst="rect">
+            <a:avLst/>
+          </a:prstGeom>
+        </p:spPr>
+      </p:pic>
+      <p:pic>
+        <p:nvPicPr>
+          <p:cNvPr id="11" name="Picture 10">
+            <a:extLst>
+              <a:ext uri="{FF2B5EF4-FFF2-40B4-BE49-F238E27FC236}">
+                <a16:creationId xmlns:a16="http://schemas.microsoft.com/office/drawing/2014/main" id="{83D7B5EF-3D30-6F03-B81B-1D055089C2F4}"/>
+              </a:ext>
+            </a:extLst>
+          </p:cNvPr>
+          <p:cNvPicPr>
+            <a:picLocks noChangeAspect="1"/>
+          </p:cNvPicPr>
+          <p:nvPr/>
+        </p:nvPicPr>
+        <p:blipFill>
+          <a:blip r:embed="rId5"/>
+          <a:stretch>
+            <a:fillRect/>
+          </a:stretch>
+        </p:blipFill>
+        <p:spPr>
+          <a:xfrm>
+            <a:off x="6121233" y="3582928"/>
+            <a:ext cx="5453185" cy="2905850"/>
+          </a:xfrm>
+          <a:prstGeom prst="rect">
+            <a:avLst/>
+          </a:prstGeom>
+        </p:spPr>
+      </p:pic>
+    </p:spTree>
+    <p:extLst>
+      <p:ext uri="{BB962C8B-B14F-4D97-AF65-F5344CB8AC3E}">
+        <p14:creationId xmlns:p14="http://schemas.microsoft.com/office/powerpoint/2010/main" val="2116087111"/>
+      </p:ext>
+    </p:extLst>
+  </p:cSld>
+  <p:clrMapOvr>
+    <a:masterClrMapping/>
+  </p:clrMapOvr>
+</p:sld>
+</file>
+
+<file path=ppt/slides/slide12.xml><?xml version="1.0" encoding="utf-8"?>
+<p:sld xmlns:a="http://schemas.openxmlformats.org/drawingml/2006/main" xmlns:r="http://schemas.openxmlformats.org/officeDocument/2006/relationships" xmlns:p="http://schemas.openxmlformats.org/presentationml/2006/main">
+  <p:cSld>
+    <p:spTree>
+      <p:nvGrpSpPr>
+        <p:cNvPr id="1" name=""/>
+        <p:cNvGrpSpPr/>
+        <p:nvPr/>
+      </p:nvGrpSpPr>
+      <p:grpSpPr>
+        <a:xfrm>
+          <a:off x="0" y="0"/>
+          <a:ext cx="0" cy="0"/>
+          <a:chOff x="0" y="0"/>
+          <a:chExt cx="0" cy="0"/>
+        </a:xfrm>
+      </p:grpSpPr>
       <p:pic>
         <p:nvPicPr>
           <p:cNvPr id="5" name="Picture 4">
@@ -19804,6 +20245,2214 @@
           <p:nvPr>
             <p:extLst>
               <p:ext uri="{D42A27DB-BD31-4B8C-83A1-F6EECF244321}">
+                <p14:modId xmlns:p14="http://schemas.microsoft.com/office/powerpoint/2010/main" val="4081659911"/>
+              </p:ext>
+            </p:extLst>
+          </p:nvPr>
+        </p:nvGraphicFramePr>
+        <p:xfrm>
+          <a:off x="1258639" y="951625"/>
+          <a:ext cx="3118683" cy="2194560"/>
+        </p:xfrm>
+        <a:graphic>
+          <a:graphicData uri="http://schemas.openxmlformats.org/drawingml/2006/table">
+            <a:tbl>
+              <a:tblPr firstRow="1" bandRow="1">
+                <a:tableStyleId>{5940675A-B579-460E-94D1-54222C63F5DA}</a:tableStyleId>
+              </a:tblPr>
+              <a:tblGrid>
+                <a:gridCol w="1039561">
+                  <a:extLst>
+                    <a:ext uri="{9D8B030D-6E8A-4147-A177-3AD203B41FA5}">
+                      <a16:colId xmlns:a16="http://schemas.microsoft.com/office/drawing/2014/main" val="1018283342"/>
+                    </a:ext>
+                  </a:extLst>
+                </a:gridCol>
+                <a:gridCol w="1039561">
+                  <a:extLst>
+                    <a:ext uri="{9D8B030D-6E8A-4147-A177-3AD203B41FA5}">
+                      <a16:colId xmlns:a16="http://schemas.microsoft.com/office/drawing/2014/main" val="3793908051"/>
+                    </a:ext>
+                  </a:extLst>
+                </a:gridCol>
+                <a:gridCol w="1039561">
+                  <a:extLst>
+                    <a:ext uri="{9D8B030D-6E8A-4147-A177-3AD203B41FA5}">
+                      <a16:colId xmlns:a16="http://schemas.microsoft.com/office/drawing/2014/main" val="190768700"/>
+                    </a:ext>
+                  </a:extLst>
+                </a:gridCol>
+              </a:tblGrid>
+              <a:tr h="432295">
+                <a:tc>
+                  <a:txBody>
+                    <a:bodyPr/>
+                    <a:lstStyle/>
+                    <a:p>
+                      <a:pPr algn="ctr"/>
+                      <a:endParaRPr lang="en-US" sz="1400" dirty="0"/>
+                    </a:p>
+                  </a:txBody>
+                  <a:tcPr>
+                    <a:solidFill>
+                      <a:schemeClr val="bg1"/>
+                    </a:solidFill>
+                  </a:tcPr>
+                </a:tc>
+                <a:tc>
+                  <a:txBody>
+                    <a:bodyPr/>
+                    <a:lstStyle/>
+                    <a:p>
+                      <a:pPr marL="0" marR="0" lvl="0" indent="0" algn="ctr" defTabSz="914400" rtl="0" eaLnBrk="1" fontAlgn="auto" latinLnBrk="0" hangingPunct="1">
+                        <a:lnSpc>
+                          <a:spcPct val="100000"/>
+                        </a:lnSpc>
+                        <a:spcBef>
+                          <a:spcPts val="0"/>
+                        </a:spcBef>
+                        <a:spcAft>
+                          <a:spcPts val="0"/>
+                        </a:spcAft>
+                        <a:buClrTx/>
+                        <a:buSzTx/>
+                        <a:buFontTx/>
+                        <a:buNone/>
+                        <a:tabLst/>
+                        <a:defRPr/>
+                      </a:pPr>
+                      <a:r>
+                        <a:rPr lang="en-US" sz="1400" b="1" u="none" strike="noStrike" cap="none" dirty="0"/>
+                        <a:t>↑↑</a:t>
+                      </a:r>
+                    </a:p>
+                    <a:p>
+                      <a:pPr algn="ctr"/>
+                      <a:r>
+                        <a:rPr lang="en-US" sz="1400" dirty="0"/>
+                        <a:t>DES vs. DOM </a:t>
+                      </a:r>
+                    </a:p>
+                  </a:txBody>
+                  <a:tcPr>
+                    <a:solidFill>
+                      <a:schemeClr val="bg1"/>
+                    </a:solidFill>
+                  </a:tcPr>
+                </a:tc>
+                <a:tc>
+                  <a:txBody>
+                    <a:bodyPr/>
+                    <a:lstStyle/>
+                    <a:p>
+                      <a:pPr marL="0" marR="0" lvl="0" indent="0" algn="ctr" defTabSz="914400" rtl="0" eaLnBrk="1" fontAlgn="auto" latinLnBrk="0" hangingPunct="1">
+                        <a:lnSpc>
+                          <a:spcPct val="100000"/>
+                        </a:lnSpc>
+                        <a:spcBef>
+                          <a:spcPts val="0"/>
+                        </a:spcBef>
+                        <a:spcAft>
+                          <a:spcPts val="0"/>
+                        </a:spcAft>
+                        <a:buClrTx/>
+                        <a:buSzTx/>
+                        <a:buFontTx/>
+                        <a:buNone/>
+                        <a:tabLst/>
+                        <a:defRPr/>
+                      </a:pPr>
+                      <a:r>
+                        <a:rPr lang="en-US" sz="1400" b="1" u="none" strike="noStrike" cap="none" dirty="0"/>
+                        <a:t>↓↓</a:t>
+                      </a:r>
+                    </a:p>
+                    <a:p>
+                      <a:pPr algn="ctr"/>
+                      <a:r>
+                        <a:rPr lang="en-US" sz="1400" dirty="0"/>
+                        <a:t>DES vs. DOM </a:t>
+                      </a:r>
+                    </a:p>
+                  </a:txBody>
+                  <a:tcPr>
+                    <a:solidFill>
+                      <a:schemeClr val="bg1"/>
+                    </a:solidFill>
+                  </a:tcPr>
+                </a:tc>
+                <a:extLst>
+                  <a:ext uri="{0D108BD9-81ED-4DB2-BD59-A6C34878D82A}">
+                    <a16:rowId xmlns:a16="http://schemas.microsoft.com/office/drawing/2014/main" val="1408692954"/>
+                  </a:ext>
+                </a:extLst>
+              </a:tr>
+              <a:tr h="649992">
+                <a:tc>
+                  <a:txBody>
+                    <a:bodyPr/>
+                    <a:lstStyle/>
+                    <a:p>
+                      <a:pPr marL="0" marR="0" lvl="0" indent="0" algn="ctr" defTabSz="914400" rtl="0" eaLnBrk="1" fontAlgn="auto" latinLnBrk="0" hangingPunct="1">
+                        <a:lnSpc>
+                          <a:spcPct val="100000"/>
+                        </a:lnSpc>
+                        <a:spcBef>
+                          <a:spcPts val="0"/>
+                        </a:spcBef>
+                        <a:spcAft>
+                          <a:spcPts val="0"/>
+                        </a:spcAft>
+                        <a:buClrTx/>
+                        <a:buSzTx/>
+                        <a:buFontTx/>
+                        <a:buNone/>
+                        <a:tabLst/>
+                        <a:defRPr/>
+                      </a:pPr>
+                      <a:r>
+                        <a:rPr lang="en-US" sz="1400" b="1" u="none" strike="noStrike" cap="none" dirty="0"/>
+                        <a:t>↑↑</a:t>
+                      </a:r>
+                    </a:p>
+                    <a:p>
+                      <a:pPr algn="ctr"/>
+                      <a:r>
+                        <a:rPr lang="en-US" sz="1400" dirty="0"/>
+                        <a:t>ASC vs. DOM </a:t>
+                      </a:r>
+                    </a:p>
+                  </a:txBody>
+                  <a:tcPr>
+                    <a:solidFill>
+                      <a:schemeClr val="bg1"/>
+                    </a:solidFill>
+                  </a:tcPr>
+                </a:tc>
+                <a:tc>
+                  <a:txBody>
+                    <a:bodyPr/>
+                    <a:lstStyle/>
+                    <a:p>
+                      <a:pPr algn="ctr"/>
+                      <a:r>
+                        <a:rPr lang="en-US" sz="1600" dirty="0"/>
+                        <a:t>66</a:t>
+                      </a:r>
+                    </a:p>
+                  </a:txBody>
+                  <a:tcPr>
+                    <a:solidFill>
+                      <a:schemeClr val="bg2">
+                        <a:lumMod val="75000"/>
+                      </a:schemeClr>
+                    </a:solidFill>
+                  </a:tcPr>
+                </a:tc>
+                <a:tc>
+                  <a:txBody>
+                    <a:bodyPr/>
+                    <a:lstStyle/>
+                    <a:p>
+                      <a:pPr algn="ctr"/>
+                      <a:r>
+                        <a:rPr lang="en-US" sz="1600" dirty="0"/>
+                        <a:t>0</a:t>
+                      </a:r>
+                    </a:p>
+                  </a:txBody>
+                  <a:tcPr>
+                    <a:solidFill>
+                      <a:schemeClr val="bg2"/>
+                    </a:solidFill>
+                  </a:tcPr>
+                </a:tc>
+                <a:extLst>
+                  <a:ext uri="{0D108BD9-81ED-4DB2-BD59-A6C34878D82A}">
+                    <a16:rowId xmlns:a16="http://schemas.microsoft.com/office/drawing/2014/main" val="3020103193"/>
+                  </a:ext>
+                </a:extLst>
+              </a:tr>
+              <a:tr h="573619">
+                <a:tc>
+                  <a:txBody>
+                    <a:bodyPr/>
+                    <a:lstStyle/>
+                    <a:p>
+                      <a:pPr marL="0" marR="0" lvl="0" indent="0" algn="ctr" defTabSz="914400" rtl="0" eaLnBrk="1" fontAlgn="auto" latinLnBrk="0" hangingPunct="1">
+                        <a:lnSpc>
+                          <a:spcPct val="100000"/>
+                        </a:lnSpc>
+                        <a:spcBef>
+                          <a:spcPts val="0"/>
+                        </a:spcBef>
+                        <a:spcAft>
+                          <a:spcPts val="0"/>
+                        </a:spcAft>
+                        <a:buClrTx/>
+                        <a:buSzTx/>
+                        <a:buFontTx/>
+                        <a:buNone/>
+                        <a:tabLst/>
+                        <a:defRPr/>
+                      </a:pPr>
+                      <a:r>
+                        <a:rPr lang="en-US" sz="1400" b="1" u="none" strike="noStrike" cap="none" dirty="0"/>
+                        <a:t>↓↓</a:t>
+                      </a:r>
+                    </a:p>
+                    <a:p>
+                      <a:pPr algn="ctr"/>
+                      <a:r>
+                        <a:rPr lang="en-US" sz="1400" dirty="0"/>
+                        <a:t>ASC vs. DOM </a:t>
+                      </a:r>
+                    </a:p>
+                  </a:txBody>
+                  <a:tcPr>
+                    <a:solidFill>
+                      <a:schemeClr val="bg1"/>
+                    </a:solidFill>
+                  </a:tcPr>
+                </a:tc>
+                <a:tc>
+                  <a:txBody>
+                    <a:bodyPr/>
+                    <a:lstStyle/>
+                    <a:p>
+                      <a:pPr algn="ctr"/>
+                      <a:r>
+                        <a:rPr lang="en-US" sz="1600" dirty="0"/>
+                        <a:t>0</a:t>
+                      </a:r>
+                    </a:p>
+                  </a:txBody>
+                  <a:tcPr>
+                    <a:solidFill>
+                      <a:schemeClr val="bg2"/>
+                    </a:solidFill>
+                  </a:tcPr>
+                </a:tc>
+                <a:tc>
+                  <a:txBody>
+                    <a:bodyPr/>
+                    <a:lstStyle/>
+                    <a:p>
+                      <a:pPr algn="ctr"/>
+                      <a:r>
+                        <a:rPr lang="en-US" sz="1600" dirty="0"/>
+                        <a:t>62</a:t>
+                      </a:r>
+                    </a:p>
+                  </a:txBody>
+                  <a:tcPr>
+                    <a:solidFill>
+                      <a:schemeClr val="bg2">
+                        <a:lumMod val="75000"/>
+                      </a:schemeClr>
+                    </a:solidFill>
+                  </a:tcPr>
+                </a:tc>
+                <a:extLst>
+                  <a:ext uri="{0D108BD9-81ED-4DB2-BD59-A6C34878D82A}">
+                    <a16:rowId xmlns:a16="http://schemas.microsoft.com/office/drawing/2014/main" val="4254393338"/>
+                  </a:ext>
+                </a:extLst>
+              </a:tr>
+            </a:tbl>
+          </a:graphicData>
+        </a:graphic>
+      </p:graphicFrame>
+      <p:graphicFrame>
+        <p:nvGraphicFramePr>
+          <p:cNvPr id="9" name="Table 8">
+            <a:extLst>
+              <a:ext uri="{FF2B5EF4-FFF2-40B4-BE49-F238E27FC236}">
+                <a16:creationId xmlns:a16="http://schemas.microsoft.com/office/drawing/2014/main" id="{FAAEDF3D-DC7E-D0E2-ADF9-C960DC5AD9AE}"/>
+              </a:ext>
+            </a:extLst>
+          </p:cNvPr>
+          <p:cNvGraphicFramePr>
+            <a:graphicFrameLocks noGrp="1"/>
+          </p:cNvGraphicFramePr>
+          <p:nvPr>
+            <p:extLst>
+              <p:ext uri="{D42A27DB-BD31-4B8C-83A1-F6EECF244321}">
+                <p14:modId xmlns:p14="http://schemas.microsoft.com/office/powerpoint/2010/main" val="1063343116"/>
+              </p:ext>
+            </p:extLst>
+          </p:nvPr>
+        </p:nvGraphicFramePr>
+        <p:xfrm>
+          <a:off x="4600753" y="951625"/>
+          <a:ext cx="3118683" cy="2194560"/>
+        </p:xfrm>
+        <a:graphic>
+          <a:graphicData uri="http://schemas.openxmlformats.org/drawingml/2006/table">
+            <a:tbl>
+              <a:tblPr firstRow="1" bandRow="1">
+                <a:tableStyleId>{5940675A-B579-460E-94D1-54222C63F5DA}</a:tableStyleId>
+              </a:tblPr>
+              <a:tblGrid>
+                <a:gridCol w="1039561">
+                  <a:extLst>
+                    <a:ext uri="{9D8B030D-6E8A-4147-A177-3AD203B41FA5}">
+                      <a16:colId xmlns:a16="http://schemas.microsoft.com/office/drawing/2014/main" val="1018283342"/>
+                    </a:ext>
+                  </a:extLst>
+                </a:gridCol>
+                <a:gridCol w="1039561">
+                  <a:extLst>
+                    <a:ext uri="{9D8B030D-6E8A-4147-A177-3AD203B41FA5}">
+                      <a16:colId xmlns:a16="http://schemas.microsoft.com/office/drawing/2014/main" val="3793908051"/>
+                    </a:ext>
+                  </a:extLst>
+                </a:gridCol>
+                <a:gridCol w="1039561">
+                  <a:extLst>
+                    <a:ext uri="{9D8B030D-6E8A-4147-A177-3AD203B41FA5}">
+                      <a16:colId xmlns:a16="http://schemas.microsoft.com/office/drawing/2014/main" val="190768700"/>
+                    </a:ext>
+                  </a:extLst>
+                </a:gridCol>
+              </a:tblGrid>
+              <a:tr h="708461">
+                <a:tc>
+                  <a:txBody>
+                    <a:bodyPr/>
+                    <a:lstStyle/>
+                    <a:p>
+                      <a:pPr algn="ctr"/>
+                      <a:endParaRPr lang="en-US" sz="1400" dirty="0"/>
+                    </a:p>
+                  </a:txBody>
+                  <a:tcPr>
+                    <a:solidFill>
+                      <a:schemeClr val="bg1"/>
+                    </a:solidFill>
+                  </a:tcPr>
+                </a:tc>
+                <a:tc>
+                  <a:txBody>
+                    <a:bodyPr/>
+                    <a:lstStyle/>
+                    <a:p>
+                      <a:pPr marL="0" marR="0" lvl="0" indent="0" algn="ctr" defTabSz="914400" rtl="0" eaLnBrk="1" fontAlgn="auto" latinLnBrk="0" hangingPunct="1">
+                        <a:lnSpc>
+                          <a:spcPct val="100000"/>
+                        </a:lnSpc>
+                        <a:spcBef>
+                          <a:spcPts val="0"/>
+                        </a:spcBef>
+                        <a:spcAft>
+                          <a:spcPts val="0"/>
+                        </a:spcAft>
+                        <a:buClrTx/>
+                        <a:buSzTx/>
+                        <a:buFontTx/>
+                        <a:buNone/>
+                        <a:tabLst/>
+                        <a:defRPr/>
+                      </a:pPr>
+                      <a:r>
+                        <a:rPr lang="en-US" sz="1400" b="1" u="none" strike="noStrike" cap="none" dirty="0"/>
+                        <a:t>↑↑</a:t>
+                      </a:r>
+                    </a:p>
+                    <a:p>
+                      <a:pPr algn="ctr"/>
+                      <a:r>
+                        <a:rPr lang="en-US" sz="1400" dirty="0"/>
+                        <a:t>DES vs.  SUB </a:t>
+                      </a:r>
+                    </a:p>
+                  </a:txBody>
+                  <a:tcPr>
+                    <a:solidFill>
+                      <a:schemeClr val="bg1"/>
+                    </a:solidFill>
+                  </a:tcPr>
+                </a:tc>
+                <a:tc>
+                  <a:txBody>
+                    <a:bodyPr/>
+                    <a:lstStyle/>
+                    <a:p>
+                      <a:pPr marL="0" marR="0" lvl="0" indent="0" algn="ctr" defTabSz="914400" rtl="0" eaLnBrk="1" fontAlgn="auto" latinLnBrk="0" hangingPunct="1">
+                        <a:lnSpc>
+                          <a:spcPct val="100000"/>
+                        </a:lnSpc>
+                        <a:spcBef>
+                          <a:spcPts val="0"/>
+                        </a:spcBef>
+                        <a:spcAft>
+                          <a:spcPts val="0"/>
+                        </a:spcAft>
+                        <a:buClrTx/>
+                        <a:buSzTx/>
+                        <a:buFontTx/>
+                        <a:buNone/>
+                        <a:tabLst/>
+                        <a:defRPr/>
+                      </a:pPr>
+                      <a:r>
+                        <a:rPr lang="en-US" sz="1400" b="1" u="none" strike="noStrike" cap="none" dirty="0"/>
+                        <a:t>↓↓</a:t>
+                      </a:r>
+                    </a:p>
+                    <a:p>
+                      <a:pPr algn="ctr"/>
+                      <a:r>
+                        <a:rPr lang="en-US" sz="1400" dirty="0"/>
+                        <a:t>DES vs.  SUB </a:t>
+                      </a:r>
+                    </a:p>
+                  </a:txBody>
+                  <a:tcPr>
+                    <a:solidFill>
+                      <a:schemeClr val="bg1"/>
+                    </a:solidFill>
+                  </a:tcPr>
+                </a:tc>
+                <a:extLst>
+                  <a:ext uri="{0D108BD9-81ED-4DB2-BD59-A6C34878D82A}">
+                    <a16:rowId xmlns:a16="http://schemas.microsoft.com/office/drawing/2014/main" val="1408692954"/>
+                  </a:ext>
+                </a:extLst>
+              </a:tr>
+              <a:tr h="697329">
+                <a:tc>
+                  <a:txBody>
+                    <a:bodyPr/>
+                    <a:lstStyle/>
+                    <a:p>
+                      <a:pPr marL="0" marR="0" lvl="0" indent="0" algn="ctr" defTabSz="914400" rtl="0" eaLnBrk="1" fontAlgn="auto" latinLnBrk="0" hangingPunct="1">
+                        <a:lnSpc>
+                          <a:spcPct val="100000"/>
+                        </a:lnSpc>
+                        <a:spcBef>
+                          <a:spcPts val="0"/>
+                        </a:spcBef>
+                        <a:spcAft>
+                          <a:spcPts val="0"/>
+                        </a:spcAft>
+                        <a:buClrTx/>
+                        <a:buSzTx/>
+                        <a:buFontTx/>
+                        <a:buNone/>
+                        <a:tabLst/>
+                        <a:defRPr/>
+                      </a:pPr>
+                      <a:r>
+                        <a:rPr lang="en-US" sz="1400" b="1" u="none" strike="noStrike" cap="none" dirty="0"/>
+                        <a:t>↑↑</a:t>
+                      </a:r>
+                    </a:p>
+                    <a:p>
+                      <a:pPr algn="ctr"/>
+                      <a:r>
+                        <a:rPr lang="en-US" sz="1400" dirty="0"/>
+                        <a:t>ASC vs.  SUB </a:t>
+                      </a:r>
+                    </a:p>
+                  </a:txBody>
+                  <a:tcPr>
+                    <a:solidFill>
+                      <a:schemeClr val="bg1"/>
+                    </a:solidFill>
+                  </a:tcPr>
+                </a:tc>
+                <a:tc>
+                  <a:txBody>
+                    <a:bodyPr/>
+                    <a:lstStyle/>
+                    <a:p>
+                      <a:pPr algn="ctr"/>
+                      <a:r>
+                        <a:rPr lang="en-US" sz="1600" dirty="0"/>
+                        <a:t>150</a:t>
+                      </a:r>
+                    </a:p>
+                  </a:txBody>
+                  <a:tcPr>
+                    <a:solidFill>
+                      <a:schemeClr val="bg2">
+                        <a:lumMod val="75000"/>
+                      </a:schemeClr>
+                    </a:solidFill>
+                  </a:tcPr>
+                </a:tc>
+                <a:tc>
+                  <a:txBody>
+                    <a:bodyPr/>
+                    <a:lstStyle/>
+                    <a:p>
+                      <a:pPr algn="ctr"/>
+                      <a:r>
+                        <a:rPr lang="en-US" sz="1600" dirty="0"/>
+                        <a:t>0</a:t>
+                      </a:r>
+                    </a:p>
+                  </a:txBody>
+                  <a:tcPr>
+                    <a:solidFill>
+                      <a:schemeClr val="bg2"/>
+                    </a:solidFill>
+                  </a:tcPr>
+                </a:tc>
+                <a:extLst>
+                  <a:ext uri="{0D108BD9-81ED-4DB2-BD59-A6C34878D82A}">
+                    <a16:rowId xmlns:a16="http://schemas.microsoft.com/office/drawing/2014/main" val="3020103193"/>
+                  </a:ext>
+                </a:extLst>
+              </a:tr>
+              <a:tr h="697329">
+                <a:tc>
+                  <a:txBody>
+                    <a:bodyPr/>
+                    <a:lstStyle/>
+                    <a:p>
+                      <a:pPr marL="0" marR="0" lvl="0" indent="0" algn="ctr" defTabSz="914400" rtl="0" eaLnBrk="1" fontAlgn="auto" latinLnBrk="0" hangingPunct="1">
+                        <a:lnSpc>
+                          <a:spcPct val="100000"/>
+                        </a:lnSpc>
+                        <a:spcBef>
+                          <a:spcPts val="0"/>
+                        </a:spcBef>
+                        <a:spcAft>
+                          <a:spcPts val="0"/>
+                        </a:spcAft>
+                        <a:buClrTx/>
+                        <a:buSzTx/>
+                        <a:buFontTx/>
+                        <a:buNone/>
+                        <a:tabLst/>
+                        <a:defRPr/>
+                      </a:pPr>
+                      <a:r>
+                        <a:rPr lang="en-US" sz="1400" b="1" u="none" strike="noStrike" cap="none" dirty="0"/>
+                        <a:t>↓↓</a:t>
+                      </a:r>
+                    </a:p>
+                    <a:p>
+                      <a:pPr algn="ctr"/>
+                      <a:r>
+                        <a:rPr lang="en-US" sz="1400" dirty="0"/>
+                        <a:t>ASC vs.  SUB </a:t>
+                      </a:r>
+                    </a:p>
+                  </a:txBody>
+                  <a:tcPr>
+                    <a:solidFill>
+                      <a:schemeClr val="bg1"/>
+                    </a:solidFill>
+                  </a:tcPr>
+                </a:tc>
+                <a:tc>
+                  <a:txBody>
+                    <a:bodyPr/>
+                    <a:lstStyle/>
+                    <a:p>
+                      <a:pPr algn="ctr"/>
+                      <a:r>
+                        <a:rPr lang="en-US" sz="1600" dirty="0"/>
+                        <a:t>0</a:t>
+                      </a:r>
+                    </a:p>
+                  </a:txBody>
+                  <a:tcPr>
+                    <a:solidFill>
+                      <a:schemeClr val="bg2"/>
+                    </a:solidFill>
+                  </a:tcPr>
+                </a:tc>
+                <a:tc>
+                  <a:txBody>
+                    <a:bodyPr/>
+                    <a:lstStyle/>
+                    <a:p>
+                      <a:pPr algn="ctr"/>
+                      <a:r>
+                        <a:rPr lang="en-US" sz="1600" dirty="0"/>
+                        <a:t>140</a:t>
+                      </a:r>
+                    </a:p>
+                  </a:txBody>
+                  <a:tcPr>
+                    <a:solidFill>
+                      <a:schemeClr val="bg2">
+                        <a:lumMod val="75000"/>
+                      </a:schemeClr>
+                    </a:solidFill>
+                  </a:tcPr>
+                </a:tc>
+                <a:extLst>
+                  <a:ext uri="{0D108BD9-81ED-4DB2-BD59-A6C34878D82A}">
+                    <a16:rowId xmlns:a16="http://schemas.microsoft.com/office/drawing/2014/main" val="4254393338"/>
+                  </a:ext>
+                </a:extLst>
+              </a:tr>
+            </a:tbl>
+          </a:graphicData>
+        </a:graphic>
+      </p:graphicFrame>
+      <p:graphicFrame>
+        <p:nvGraphicFramePr>
+          <p:cNvPr id="10" name="Table 9">
+            <a:extLst>
+              <a:ext uri="{FF2B5EF4-FFF2-40B4-BE49-F238E27FC236}">
+                <a16:creationId xmlns:a16="http://schemas.microsoft.com/office/drawing/2014/main" id="{94992ABF-BCA6-1B01-BF07-0CC8A573BC07}"/>
+              </a:ext>
+            </a:extLst>
+          </p:cNvPr>
+          <p:cNvGraphicFramePr>
+            <a:graphicFrameLocks noGrp="1"/>
+          </p:cNvGraphicFramePr>
+          <p:nvPr>
+            <p:extLst>
+              <p:ext uri="{D42A27DB-BD31-4B8C-83A1-F6EECF244321}">
+                <p14:modId xmlns:p14="http://schemas.microsoft.com/office/powerpoint/2010/main" val="1262619233"/>
+              </p:ext>
+            </p:extLst>
+          </p:nvPr>
+        </p:nvGraphicFramePr>
+        <p:xfrm>
+          <a:off x="7942867" y="951625"/>
+          <a:ext cx="3118683" cy="2194560"/>
+        </p:xfrm>
+        <a:graphic>
+          <a:graphicData uri="http://schemas.openxmlformats.org/drawingml/2006/table">
+            <a:tbl>
+              <a:tblPr firstRow="1" bandRow="1">
+                <a:tableStyleId>{5940675A-B579-460E-94D1-54222C63F5DA}</a:tableStyleId>
+              </a:tblPr>
+              <a:tblGrid>
+                <a:gridCol w="1039561">
+                  <a:extLst>
+                    <a:ext uri="{9D8B030D-6E8A-4147-A177-3AD203B41FA5}">
+                      <a16:colId xmlns:a16="http://schemas.microsoft.com/office/drawing/2014/main" val="1018283342"/>
+                    </a:ext>
+                  </a:extLst>
+                </a:gridCol>
+                <a:gridCol w="1039561">
+                  <a:extLst>
+                    <a:ext uri="{9D8B030D-6E8A-4147-A177-3AD203B41FA5}">
+                      <a16:colId xmlns:a16="http://schemas.microsoft.com/office/drawing/2014/main" val="3793908051"/>
+                    </a:ext>
+                  </a:extLst>
+                </a:gridCol>
+                <a:gridCol w="1039561">
+                  <a:extLst>
+                    <a:ext uri="{9D8B030D-6E8A-4147-A177-3AD203B41FA5}">
+                      <a16:colId xmlns:a16="http://schemas.microsoft.com/office/drawing/2014/main" val="190768700"/>
+                    </a:ext>
+                  </a:extLst>
+                </a:gridCol>
+              </a:tblGrid>
+              <a:tr h="686267">
+                <a:tc>
+                  <a:txBody>
+                    <a:bodyPr/>
+                    <a:lstStyle/>
+                    <a:p>
+                      <a:pPr algn="ctr"/>
+                      <a:endParaRPr lang="en-US" sz="1400" dirty="0"/>
+                    </a:p>
+                  </a:txBody>
+                  <a:tcPr>
+                    <a:solidFill>
+                      <a:schemeClr val="bg1"/>
+                    </a:solidFill>
+                  </a:tcPr>
+                </a:tc>
+                <a:tc>
+                  <a:txBody>
+                    <a:bodyPr/>
+                    <a:lstStyle/>
+                    <a:p>
+                      <a:pPr marL="0" marR="0" lvl="0" indent="0" algn="ctr" defTabSz="914400" rtl="0" eaLnBrk="1" fontAlgn="auto" latinLnBrk="0" hangingPunct="1">
+                        <a:lnSpc>
+                          <a:spcPct val="100000"/>
+                        </a:lnSpc>
+                        <a:spcBef>
+                          <a:spcPts val="0"/>
+                        </a:spcBef>
+                        <a:spcAft>
+                          <a:spcPts val="0"/>
+                        </a:spcAft>
+                        <a:buClrTx/>
+                        <a:buSzTx/>
+                        <a:buFontTx/>
+                        <a:buNone/>
+                        <a:tabLst/>
+                        <a:defRPr/>
+                      </a:pPr>
+                      <a:r>
+                        <a:rPr lang="en-US" sz="1400" b="1" u="none" strike="noStrike" cap="none" dirty="0"/>
+                        <a:t>↑↑</a:t>
+                      </a:r>
+                    </a:p>
+                    <a:p>
+                      <a:pPr algn="ctr"/>
+                      <a:r>
+                        <a:rPr lang="en-US" sz="1400" dirty="0"/>
+                        <a:t>TRN vs. DOM </a:t>
+                      </a:r>
+                    </a:p>
+                  </a:txBody>
+                  <a:tcPr>
+                    <a:solidFill>
+                      <a:schemeClr val="bg1"/>
+                    </a:solidFill>
+                  </a:tcPr>
+                </a:tc>
+                <a:tc>
+                  <a:txBody>
+                    <a:bodyPr/>
+                    <a:lstStyle/>
+                    <a:p>
+                      <a:pPr marL="0" marR="0" lvl="0" indent="0" algn="ctr" defTabSz="914400" rtl="0" eaLnBrk="1" fontAlgn="auto" latinLnBrk="0" hangingPunct="1">
+                        <a:lnSpc>
+                          <a:spcPct val="100000"/>
+                        </a:lnSpc>
+                        <a:spcBef>
+                          <a:spcPts val="0"/>
+                        </a:spcBef>
+                        <a:spcAft>
+                          <a:spcPts val="0"/>
+                        </a:spcAft>
+                        <a:buClrTx/>
+                        <a:buSzTx/>
+                        <a:buFontTx/>
+                        <a:buNone/>
+                        <a:tabLst/>
+                        <a:defRPr/>
+                      </a:pPr>
+                      <a:r>
+                        <a:rPr lang="en-US" sz="1400" b="1" u="none" strike="noStrike" cap="none" dirty="0"/>
+                        <a:t>↓↓</a:t>
+                      </a:r>
+                    </a:p>
+                    <a:p>
+                      <a:pPr algn="ctr"/>
+                      <a:r>
+                        <a:rPr lang="en-US" sz="1400" dirty="0"/>
+                        <a:t>TRN vs. DOM </a:t>
+                      </a:r>
+                    </a:p>
+                  </a:txBody>
+                  <a:tcPr>
+                    <a:solidFill>
+                      <a:schemeClr val="bg1"/>
+                    </a:solidFill>
+                  </a:tcPr>
+                </a:tc>
+                <a:extLst>
+                  <a:ext uri="{0D108BD9-81ED-4DB2-BD59-A6C34878D82A}">
+                    <a16:rowId xmlns:a16="http://schemas.microsoft.com/office/drawing/2014/main" val="1408692954"/>
+                  </a:ext>
+                </a:extLst>
+              </a:tr>
+              <a:tr h="649992">
+                <a:tc>
+                  <a:txBody>
+                    <a:bodyPr/>
+                    <a:lstStyle/>
+                    <a:p>
+                      <a:pPr marL="0" marR="0" lvl="0" indent="0" algn="ctr" defTabSz="914400" rtl="0" eaLnBrk="1" fontAlgn="auto" latinLnBrk="0" hangingPunct="1">
+                        <a:lnSpc>
+                          <a:spcPct val="100000"/>
+                        </a:lnSpc>
+                        <a:spcBef>
+                          <a:spcPts val="0"/>
+                        </a:spcBef>
+                        <a:spcAft>
+                          <a:spcPts val="0"/>
+                        </a:spcAft>
+                        <a:buClrTx/>
+                        <a:buSzTx/>
+                        <a:buFontTx/>
+                        <a:buNone/>
+                        <a:tabLst/>
+                        <a:defRPr/>
+                      </a:pPr>
+                      <a:r>
+                        <a:rPr lang="en-US" sz="1400" b="1" u="none" strike="noStrike" cap="none" dirty="0"/>
+                        <a:t>↑↑</a:t>
+                      </a:r>
+                    </a:p>
+                    <a:p>
+                      <a:pPr algn="ctr"/>
+                      <a:r>
+                        <a:rPr lang="en-US" sz="1400" dirty="0"/>
+                        <a:t>TRN vs. SUB </a:t>
+                      </a:r>
+                    </a:p>
+                  </a:txBody>
+                  <a:tcPr>
+                    <a:solidFill>
+                      <a:schemeClr val="bg1"/>
+                    </a:solidFill>
+                  </a:tcPr>
+                </a:tc>
+                <a:tc>
+                  <a:txBody>
+                    <a:bodyPr/>
+                    <a:lstStyle/>
+                    <a:p>
+                      <a:pPr algn="ctr"/>
+                      <a:r>
+                        <a:rPr lang="en-US" sz="1600" dirty="0"/>
+                        <a:t>8</a:t>
+                      </a:r>
+                    </a:p>
+                  </a:txBody>
+                  <a:tcPr>
+                    <a:solidFill>
+                      <a:schemeClr val="bg2">
+                        <a:lumMod val="75000"/>
+                      </a:schemeClr>
+                    </a:solidFill>
+                  </a:tcPr>
+                </a:tc>
+                <a:tc>
+                  <a:txBody>
+                    <a:bodyPr/>
+                    <a:lstStyle/>
+                    <a:p>
+                      <a:pPr algn="ctr"/>
+                      <a:r>
+                        <a:rPr lang="en-US" sz="1600" dirty="0"/>
+                        <a:t>0</a:t>
+                      </a:r>
+                    </a:p>
+                  </a:txBody>
+                  <a:tcPr>
+                    <a:solidFill>
+                      <a:schemeClr val="bg2"/>
+                    </a:solidFill>
+                  </a:tcPr>
+                </a:tc>
+                <a:extLst>
+                  <a:ext uri="{0D108BD9-81ED-4DB2-BD59-A6C34878D82A}">
+                    <a16:rowId xmlns:a16="http://schemas.microsoft.com/office/drawing/2014/main" val="3020103193"/>
+                  </a:ext>
+                </a:extLst>
+              </a:tr>
+              <a:tr h="612973">
+                <a:tc>
+                  <a:txBody>
+                    <a:bodyPr/>
+                    <a:lstStyle/>
+                    <a:p>
+                      <a:pPr marL="0" marR="0" lvl="0" indent="0" algn="ctr" defTabSz="914400" rtl="0" eaLnBrk="1" fontAlgn="auto" latinLnBrk="0" hangingPunct="1">
+                        <a:lnSpc>
+                          <a:spcPct val="100000"/>
+                        </a:lnSpc>
+                        <a:spcBef>
+                          <a:spcPts val="0"/>
+                        </a:spcBef>
+                        <a:spcAft>
+                          <a:spcPts val="0"/>
+                        </a:spcAft>
+                        <a:buClrTx/>
+                        <a:buSzTx/>
+                        <a:buFontTx/>
+                        <a:buNone/>
+                        <a:tabLst/>
+                        <a:defRPr/>
+                      </a:pPr>
+                      <a:r>
+                        <a:rPr lang="en-US" sz="1400" b="1" u="none" strike="noStrike" cap="none" dirty="0"/>
+                        <a:t>↓↓</a:t>
+                      </a:r>
+                    </a:p>
+                    <a:p>
+                      <a:pPr algn="ctr"/>
+                      <a:r>
+                        <a:rPr lang="en-US" sz="1400" dirty="0"/>
+                        <a:t>TRN vs. SUB</a:t>
+                      </a:r>
+                    </a:p>
+                  </a:txBody>
+                  <a:tcPr>
+                    <a:solidFill>
+                      <a:schemeClr val="bg1"/>
+                    </a:solidFill>
+                  </a:tcPr>
+                </a:tc>
+                <a:tc>
+                  <a:txBody>
+                    <a:bodyPr/>
+                    <a:lstStyle/>
+                    <a:p>
+                      <a:pPr algn="ctr"/>
+                      <a:r>
+                        <a:rPr lang="en-US" sz="1600" dirty="0"/>
+                        <a:t>0</a:t>
+                      </a:r>
+                    </a:p>
+                  </a:txBody>
+                  <a:tcPr>
+                    <a:solidFill>
+                      <a:schemeClr val="bg2"/>
+                    </a:solidFill>
+                  </a:tcPr>
+                </a:tc>
+                <a:tc>
+                  <a:txBody>
+                    <a:bodyPr/>
+                    <a:lstStyle/>
+                    <a:p>
+                      <a:pPr algn="ctr"/>
+                      <a:r>
+                        <a:rPr lang="en-US" sz="1600" dirty="0"/>
+                        <a:t>10</a:t>
+                      </a:r>
+                    </a:p>
+                  </a:txBody>
+                  <a:tcPr>
+                    <a:solidFill>
+                      <a:schemeClr val="bg2">
+                        <a:lumMod val="75000"/>
+                      </a:schemeClr>
+                    </a:solidFill>
+                  </a:tcPr>
+                </a:tc>
+                <a:extLst>
+                  <a:ext uri="{0D108BD9-81ED-4DB2-BD59-A6C34878D82A}">
+                    <a16:rowId xmlns:a16="http://schemas.microsoft.com/office/drawing/2014/main" val="4254393338"/>
+                  </a:ext>
+                </a:extLst>
+              </a:tr>
+            </a:tbl>
+          </a:graphicData>
+        </a:graphic>
+      </p:graphicFrame>
+      <p:sp>
+        <p:nvSpPr>
+          <p:cNvPr id="11" name="TextBox 10">
+            <a:extLst>
+              <a:ext uri="{FF2B5EF4-FFF2-40B4-BE49-F238E27FC236}">
+                <a16:creationId xmlns:a16="http://schemas.microsoft.com/office/drawing/2014/main" id="{C6A89425-2AA4-C5E1-98C2-2C1DFE35A901}"/>
+              </a:ext>
+            </a:extLst>
+          </p:cNvPr>
+          <p:cNvSpPr txBox="1"/>
+          <p:nvPr/>
+        </p:nvSpPr>
+        <p:spPr>
+          <a:xfrm>
+            <a:off x="704296" y="1399438"/>
+            <a:ext cx="492443" cy="1558506"/>
+          </a:xfrm>
+          <a:prstGeom prst="rect">
+            <a:avLst/>
+          </a:prstGeom>
+          <a:noFill/>
+        </p:spPr>
+        <p:txBody>
+          <a:bodyPr vert="vert270" wrap="square" rtlCol="0">
+            <a:spAutoFit/>
+          </a:bodyPr>
+          <a:lstStyle/>
+          <a:p>
+            <a:pPr algn="ctr"/>
+            <a:r>
+              <a:rPr lang="en-US" sz="2000" b="1" dirty="0"/>
+              <a:t>70 minutes </a:t>
+            </a:r>
+          </a:p>
+        </p:txBody>
+      </p:sp>
+      <p:graphicFrame>
+        <p:nvGraphicFramePr>
+          <p:cNvPr id="12" name="Table 11">
+            <a:extLst>
+              <a:ext uri="{FF2B5EF4-FFF2-40B4-BE49-F238E27FC236}">
+                <a16:creationId xmlns:a16="http://schemas.microsoft.com/office/drawing/2014/main" id="{FE461BB6-4C08-1802-819E-4E2711294760}"/>
+              </a:ext>
+            </a:extLst>
+          </p:cNvPr>
+          <p:cNvGraphicFramePr>
+            <a:graphicFrameLocks noGrp="1"/>
+          </p:cNvGraphicFramePr>
+          <p:nvPr>
+            <p:extLst>
+              <p:ext uri="{D42A27DB-BD31-4B8C-83A1-F6EECF244321}">
+                <p14:modId xmlns:p14="http://schemas.microsoft.com/office/powerpoint/2010/main" val="3891936530"/>
+              </p:ext>
+            </p:extLst>
+          </p:nvPr>
+        </p:nvGraphicFramePr>
+        <p:xfrm>
+          <a:off x="1258639" y="3429000"/>
+          <a:ext cx="3118104" cy="2194560"/>
+        </p:xfrm>
+        <a:graphic>
+          <a:graphicData uri="http://schemas.openxmlformats.org/drawingml/2006/table">
+            <a:tbl>
+              <a:tblPr firstRow="1" bandRow="1">
+                <a:tableStyleId>{5940675A-B579-460E-94D1-54222C63F5DA}</a:tableStyleId>
+              </a:tblPr>
+              <a:tblGrid>
+                <a:gridCol w="1039368">
+                  <a:extLst>
+                    <a:ext uri="{9D8B030D-6E8A-4147-A177-3AD203B41FA5}">
+                      <a16:colId xmlns:a16="http://schemas.microsoft.com/office/drawing/2014/main" val="1018283342"/>
+                    </a:ext>
+                  </a:extLst>
+                </a:gridCol>
+                <a:gridCol w="1039368">
+                  <a:extLst>
+                    <a:ext uri="{9D8B030D-6E8A-4147-A177-3AD203B41FA5}">
+                      <a16:colId xmlns:a16="http://schemas.microsoft.com/office/drawing/2014/main" val="3793908051"/>
+                    </a:ext>
+                  </a:extLst>
+                </a:gridCol>
+                <a:gridCol w="1039368">
+                  <a:extLst>
+                    <a:ext uri="{9D8B030D-6E8A-4147-A177-3AD203B41FA5}">
+                      <a16:colId xmlns:a16="http://schemas.microsoft.com/office/drawing/2014/main" val="190768700"/>
+                    </a:ext>
+                  </a:extLst>
+                </a:gridCol>
+              </a:tblGrid>
+              <a:tr h="708462">
+                <a:tc>
+                  <a:txBody>
+                    <a:bodyPr/>
+                    <a:lstStyle/>
+                    <a:p>
+                      <a:pPr algn="ctr"/>
+                      <a:endParaRPr lang="en-US" sz="1400" b="0" dirty="0"/>
+                    </a:p>
+                  </a:txBody>
+                  <a:tcPr>
+                    <a:solidFill>
+                      <a:schemeClr val="bg1"/>
+                    </a:solidFill>
+                  </a:tcPr>
+                </a:tc>
+                <a:tc>
+                  <a:txBody>
+                    <a:bodyPr/>
+                    <a:lstStyle/>
+                    <a:p>
+                      <a:pPr marL="0" marR="0" lvl="0" indent="0" algn="ctr" defTabSz="914400" rtl="0" eaLnBrk="1" fontAlgn="auto" latinLnBrk="0" hangingPunct="1">
+                        <a:lnSpc>
+                          <a:spcPct val="100000"/>
+                        </a:lnSpc>
+                        <a:spcBef>
+                          <a:spcPts val="0"/>
+                        </a:spcBef>
+                        <a:spcAft>
+                          <a:spcPts val="0"/>
+                        </a:spcAft>
+                        <a:buClrTx/>
+                        <a:buSzTx/>
+                        <a:buFontTx/>
+                        <a:buNone/>
+                        <a:tabLst/>
+                        <a:defRPr/>
+                      </a:pPr>
+                      <a:r>
+                        <a:rPr lang="en-US" sz="1400" b="1" u="none" strike="noStrike" cap="none" dirty="0"/>
+                        <a:t>↑↑</a:t>
+                      </a:r>
+                    </a:p>
+                    <a:p>
+                      <a:pPr algn="ctr"/>
+                      <a:r>
+                        <a:rPr lang="en-US" sz="1400" b="0" dirty="0"/>
+                        <a:t>DES vs. DOM </a:t>
+                      </a:r>
+                    </a:p>
+                  </a:txBody>
+                  <a:tcPr>
+                    <a:solidFill>
+                      <a:schemeClr val="bg1"/>
+                    </a:solidFill>
+                  </a:tcPr>
+                </a:tc>
+                <a:tc>
+                  <a:txBody>
+                    <a:bodyPr/>
+                    <a:lstStyle/>
+                    <a:p>
+                      <a:pPr marL="0" marR="0" lvl="0" indent="0" algn="ctr" defTabSz="914400" rtl="0" eaLnBrk="1" fontAlgn="auto" latinLnBrk="0" hangingPunct="1">
+                        <a:lnSpc>
+                          <a:spcPct val="100000"/>
+                        </a:lnSpc>
+                        <a:spcBef>
+                          <a:spcPts val="0"/>
+                        </a:spcBef>
+                        <a:spcAft>
+                          <a:spcPts val="0"/>
+                        </a:spcAft>
+                        <a:buClrTx/>
+                        <a:buSzTx/>
+                        <a:buFontTx/>
+                        <a:buNone/>
+                        <a:tabLst/>
+                        <a:defRPr/>
+                      </a:pPr>
+                      <a:r>
+                        <a:rPr lang="en-US" sz="1400" b="1" u="none" strike="noStrike" cap="none" dirty="0"/>
+                        <a:t>↓↓</a:t>
+                      </a:r>
+                    </a:p>
+                    <a:p>
+                      <a:pPr algn="ctr"/>
+                      <a:r>
+                        <a:rPr lang="en-US" sz="1400" b="0" dirty="0"/>
+                        <a:t>DES vs. DOM </a:t>
+                      </a:r>
+                    </a:p>
+                  </a:txBody>
+                  <a:tcPr>
+                    <a:solidFill>
+                      <a:schemeClr val="bg1"/>
+                    </a:solidFill>
+                  </a:tcPr>
+                </a:tc>
+                <a:extLst>
+                  <a:ext uri="{0D108BD9-81ED-4DB2-BD59-A6C34878D82A}">
+                    <a16:rowId xmlns:a16="http://schemas.microsoft.com/office/drawing/2014/main" val="1408692954"/>
+                  </a:ext>
+                </a:extLst>
+              </a:tr>
+              <a:tr h="697329">
+                <a:tc>
+                  <a:txBody>
+                    <a:bodyPr/>
+                    <a:lstStyle/>
+                    <a:p>
+                      <a:pPr marL="0" marR="0" lvl="0" indent="0" algn="ctr" defTabSz="914400" rtl="0" eaLnBrk="1" fontAlgn="auto" latinLnBrk="0" hangingPunct="1">
+                        <a:lnSpc>
+                          <a:spcPct val="100000"/>
+                        </a:lnSpc>
+                        <a:spcBef>
+                          <a:spcPts val="0"/>
+                        </a:spcBef>
+                        <a:spcAft>
+                          <a:spcPts val="0"/>
+                        </a:spcAft>
+                        <a:buClrTx/>
+                        <a:buSzTx/>
+                        <a:buFontTx/>
+                        <a:buNone/>
+                        <a:tabLst/>
+                        <a:defRPr/>
+                      </a:pPr>
+                      <a:r>
+                        <a:rPr lang="en-US" sz="1400" b="1" u="none" strike="noStrike" cap="none" dirty="0"/>
+                        <a:t>↑↑</a:t>
+                      </a:r>
+                    </a:p>
+                    <a:p>
+                      <a:pPr algn="ctr"/>
+                      <a:r>
+                        <a:rPr lang="en-US" sz="1400" dirty="0"/>
+                        <a:t>ASC vs. DOM </a:t>
+                      </a:r>
+                    </a:p>
+                  </a:txBody>
+                  <a:tcPr>
+                    <a:solidFill>
+                      <a:schemeClr val="bg1"/>
+                    </a:solidFill>
+                  </a:tcPr>
+                </a:tc>
+                <a:tc>
+                  <a:txBody>
+                    <a:bodyPr/>
+                    <a:lstStyle/>
+                    <a:p>
+                      <a:pPr algn="ctr"/>
+                      <a:r>
+                        <a:rPr lang="en-US" sz="1600" dirty="0"/>
+                        <a:t>28</a:t>
+                      </a:r>
+                    </a:p>
+                  </a:txBody>
+                  <a:tcPr>
+                    <a:solidFill>
+                      <a:schemeClr val="bg2">
+                        <a:lumMod val="75000"/>
+                      </a:schemeClr>
+                    </a:solidFill>
+                  </a:tcPr>
+                </a:tc>
+                <a:tc>
+                  <a:txBody>
+                    <a:bodyPr/>
+                    <a:lstStyle/>
+                    <a:p>
+                      <a:pPr algn="ctr"/>
+                      <a:r>
+                        <a:rPr lang="en-US" sz="1600" dirty="0"/>
+                        <a:t>0</a:t>
+                      </a:r>
+                    </a:p>
+                  </a:txBody>
+                  <a:tcPr>
+                    <a:solidFill>
+                      <a:schemeClr val="bg2"/>
+                    </a:solidFill>
+                  </a:tcPr>
+                </a:tc>
+                <a:extLst>
+                  <a:ext uri="{0D108BD9-81ED-4DB2-BD59-A6C34878D82A}">
+                    <a16:rowId xmlns:a16="http://schemas.microsoft.com/office/drawing/2014/main" val="3020103193"/>
+                  </a:ext>
+                </a:extLst>
+              </a:tr>
+              <a:tr h="697329">
+                <a:tc>
+                  <a:txBody>
+                    <a:bodyPr/>
+                    <a:lstStyle/>
+                    <a:p>
+                      <a:pPr marL="0" marR="0" lvl="0" indent="0" algn="ctr" defTabSz="914400" rtl="0" eaLnBrk="1" fontAlgn="auto" latinLnBrk="0" hangingPunct="1">
+                        <a:lnSpc>
+                          <a:spcPct val="100000"/>
+                        </a:lnSpc>
+                        <a:spcBef>
+                          <a:spcPts val="0"/>
+                        </a:spcBef>
+                        <a:spcAft>
+                          <a:spcPts val="0"/>
+                        </a:spcAft>
+                        <a:buClrTx/>
+                        <a:buSzTx/>
+                        <a:buFontTx/>
+                        <a:buNone/>
+                        <a:tabLst/>
+                        <a:defRPr/>
+                      </a:pPr>
+                      <a:r>
+                        <a:rPr lang="en-US" sz="1400" b="1" u="none" strike="noStrike" cap="none" dirty="0"/>
+                        <a:t>↓↓</a:t>
+                      </a:r>
+                    </a:p>
+                    <a:p>
+                      <a:pPr algn="ctr"/>
+                      <a:r>
+                        <a:rPr lang="en-US" sz="1400" dirty="0"/>
+                        <a:t>ASC vs. DOM </a:t>
+                      </a:r>
+                    </a:p>
+                  </a:txBody>
+                  <a:tcPr>
+                    <a:solidFill>
+                      <a:schemeClr val="bg1"/>
+                    </a:solidFill>
+                  </a:tcPr>
+                </a:tc>
+                <a:tc>
+                  <a:txBody>
+                    <a:bodyPr/>
+                    <a:lstStyle/>
+                    <a:p>
+                      <a:pPr algn="ctr"/>
+                      <a:r>
+                        <a:rPr lang="en-US" sz="1600" dirty="0"/>
+                        <a:t>0</a:t>
+                      </a:r>
+                    </a:p>
+                  </a:txBody>
+                  <a:tcPr>
+                    <a:solidFill>
+                      <a:schemeClr val="bg2"/>
+                    </a:solidFill>
+                  </a:tcPr>
+                </a:tc>
+                <a:tc>
+                  <a:txBody>
+                    <a:bodyPr/>
+                    <a:lstStyle/>
+                    <a:p>
+                      <a:pPr algn="ctr"/>
+                      <a:r>
+                        <a:rPr lang="en-US" sz="1600" dirty="0"/>
+                        <a:t>32</a:t>
+                      </a:r>
+                    </a:p>
+                  </a:txBody>
+                  <a:tcPr>
+                    <a:solidFill>
+                      <a:schemeClr val="bg2">
+                        <a:lumMod val="75000"/>
+                      </a:schemeClr>
+                    </a:solidFill>
+                  </a:tcPr>
+                </a:tc>
+                <a:extLst>
+                  <a:ext uri="{0D108BD9-81ED-4DB2-BD59-A6C34878D82A}">
+                    <a16:rowId xmlns:a16="http://schemas.microsoft.com/office/drawing/2014/main" val="4254393338"/>
+                  </a:ext>
+                </a:extLst>
+              </a:tr>
+            </a:tbl>
+          </a:graphicData>
+        </a:graphic>
+      </p:graphicFrame>
+      <p:graphicFrame>
+        <p:nvGraphicFramePr>
+          <p:cNvPr id="13" name="Table 12">
+            <a:extLst>
+              <a:ext uri="{FF2B5EF4-FFF2-40B4-BE49-F238E27FC236}">
+                <a16:creationId xmlns:a16="http://schemas.microsoft.com/office/drawing/2014/main" id="{956E8830-682E-327C-3D5A-676E0A96FC00}"/>
+              </a:ext>
+            </a:extLst>
+          </p:cNvPr>
+          <p:cNvGraphicFramePr>
+            <a:graphicFrameLocks noGrp="1"/>
+          </p:cNvGraphicFramePr>
+          <p:nvPr>
+            <p:extLst>
+              <p:ext uri="{D42A27DB-BD31-4B8C-83A1-F6EECF244321}">
+                <p14:modId xmlns:p14="http://schemas.microsoft.com/office/powerpoint/2010/main" val="3177612873"/>
+              </p:ext>
+            </p:extLst>
+          </p:nvPr>
+        </p:nvGraphicFramePr>
+        <p:xfrm>
+          <a:off x="4601332" y="3429000"/>
+          <a:ext cx="3118104" cy="2194560"/>
+        </p:xfrm>
+        <a:graphic>
+          <a:graphicData uri="http://schemas.openxmlformats.org/drawingml/2006/table">
+            <a:tbl>
+              <a:tblPr firstRow="1" bandRow="1">
+                <a:tableStyleId>{5940675A-B579-460E-94D1-54222C63F5DA}</a:tableStyleId>
+              </a:tblPr>
+              <a:tblGrid>
+                <a:gridCol w="1039368">
+                  <a:extLst>
+                    <a:ext uri="{9D8B030D-6E8A-4147-A177-3AD203B41FA5}">
+                      <a16:colId xmlns:a16="http://schemas.microsoft.com/office/drawing/2014/main" val="1018283342"/>
+                    </a:ext>
+                  </a:extLst>
+                </a:gridCol>
+                <a:gridCol w="1039368">
+                  <a:extLst>
+                    <a:ext uri="{9D8B030D-6E8A-4147-A177-3AD203B41FA5}">
+                      <a16:colId xmlns:a16="http://schemas.microsoft.com/office/drawing/2014/main" val="3793908051"/>
+                    </a:ext>
+                  </a:extLst>
+                </a:gridCol>
+                <a:gridCol w="1039368">
+                  <a:extLst>
+                    <a:ext uri="{9D8B030D-6E8A-4147-A177-3AD203B41FA5}">
+                      <a16:colId xmlns:a16="http://schemas.microsoft.com/office/drawing/2014/main" val="190768700"/>
+                    </a:ext>
+                  </a:extLst>
+                </a:gridCol>
+              </a:tblGrid>
+              <a:tr h="708462">
+                <a:tc>
+                  <a:txBody>
+                    <a:bodyPr/>
+                    <a:lstStyle/>
+                    <a:p>
+                      <a:pPr algn="ctr"/>
+                      <a:endParaRPr lang="en-US" sz="1400" dirty="0"/>
+                    </a:p>
+                  </a:txBody>
+                  <a:tcPr>
+                    <a:solidFill>
+                      <a:schemeClr val="bg1"/>
+                    </a:solidFill>
+                  </a:tcPr>
+                </a:tc>
+                <a:tc>
+                  <a:txBody>
+                    <a:bodyPr/>
+                    <a:lstStyle/>
+                    <a:p>
+                      <a:pPr marL="0" marR="0" lvl="0" indent="0" algn="ctr" defTabSz="914400" rtl="0" eaLnBrk="1" fontAlgn="auto" latinLnBrk="0" hangingPunct="1">
+                        <a:lnSpc>
+                          <a:spcPct val="100000"/>
+                        </a:lnSpc>
+                        <a:spcBef>
+                          <a:spcPts val="0"/>
+                        </a:spcBef>
+                        <a:spcAft>
+                          <a:spcPts val="0"/>
+                        </a:spcAft>
+                        <a:buClrTx/>
+                        <a:buSzTx/>
+                        <a:buFontTx/>
+                        <a:buNone/>
+                        <a:tabLst/>
+                        <a:defRPr/>
+                      </a:pPr>
+                      <a:r>
+                        <a:rPr lang="en-US" sz="1400" b="1" u="none" strike="noStrike" cap="none" dirty="0"/>
+                        <a:t>↑↑</a:t>
+                      </a:r>
+                    </a:p>
+                    <a:p>
+                      <a:pPr algn="ctr"/>
+                      <a:r>
+                        <a:rPr lang="en-US" sz="1400" dirty="0"/>
+                        <a:t>DES vs.  SUB </a:t>
+                      </a:r>
+                    </a:p>
+                  </a:txBody>
+                  <a:tcPr>
+                    <a:solidFill>
+                      <a:schemeClr val="bg1"/>
+                    </a:solidFill>
+                  </a:tcPr>
+                </a:tc>
+                <a:tc>
+                  <a:txBody>
+                    <a:bodyPr/>
+                    <a:lstStyle/>
+                    <a:p>
+                      <a:pPr marL="0" marR="0" lvl="0" indent="0" algn="ctr" defTabSz="914400" rtl="0" eaLnBrk="1" fontAlgn="auto" latinLnBrk="0" hangingPunct="1">
+                        <a:lnSpc>
+                          <a:spcPct val="100000"/>
+                        </a:lnSpc>
+                        <a:spcBef>
+                          <a:spcPts val="0"/>
+                        </a:spcBef>
+                        <a:spcAft>
+                          <a:spcPts val="0"/>
+                        </a:spcAft>
+                        <a:buClrTx/>
+                        <a:buSzTx/>
+                        <a:buFontTx/>
+                        <a:buNone/>
+                        <a:tabLst/>
+                        <a:defRPr/>
+                      </a:pPr>
+                      <a:r>
+                        <a:rPr lang="en-US" sz="1400" b="1" u="none" strike="noStrike" cap="none" dirty="0"/>
+                        <a:t>↓↓</a:t>
+                      </a:r>
+                    </a:p>
+                    <a:p>
+                      <a:pPr algn="ctr"/>
+                      <a:r>
+                        <a:rPr lang="en-US" sz="1400" dirty="0"/>
+                        <a:t>DES vs.  SUB </a:t>
+                      </a:r>
+                    </a:p>
+                  </a:txBody>
+                  <a:tcPr>
+                    <a:solidFill>
+                      <a:schemeClr val="bg1"/>
+                    </a:solidFill>
+                  </a:tcPr>
+                </a:tc>
+                <a:extLst>
+                  <a:ext uri="{0D108BD9-81ED-4DB2-BD59-A6C34878D82A}">
+                    <a16:rowId xmlns:a16="http://schemas.microsoft.com/office/drawing/2014/main" val="1408692954"/>
+                  </a:ext>
+                </a:extLst>
+              </a:tr>
+              <a:tr h="697329">
+                <a:tc>
+                  <a:txBody>
+                    <a:bodyPr/>
+                    <a:lstStyle/>
+                    <a:p>
+                      <a:pPr marL="0" marR="0" lvl="0" indent="0" algn="ctr" defTabSz="914400" rtl="0" eaLnBrk="1" fontAlgn="auto" latinLnBrk="0" hangingPunct="1">
+                        <a:lnSpc>
+                          <a:spcPct val="100000"/>
+                        </a:lnSpc>
+                        <a:spcBef>
+                          <a:spcPts val="0"/>
+                        </a:spcBef>
+                        <a:spcAft>
+                          <a:spcPts val="0"/>
+                        </a:spcAft>
+                        <a:buClrTx/>
+                        <a:buSzTx/>
+                        <a:buFontTx/>
+                        <a:buNone/>
+                        <a:tabLst/>
+                        <a:defRPr/>
+                      </a:pPr>
+                      <a:r>
+                        <a:rPr lang="en-US" sz="1400" b="1" u="none" strike="noStrike" cap="none" dirty="0"/>
+                        <a:t>↑↑</a:t>
+                      </a:r>
+                    </a:p>
+                    <a:p>
+                      <a:pPr algn="ctr"/>
+                      <a:r>
+                        <a:rPr lang="en-US" sz="1400" dirty="0"/>
+                        <a:t>ASC vs.  SUB </a:t>
+                      </a:r>
+                    </a:p>
+                  </a:txBody>
+                  <a:tcPr>
+                    <a:solidFill>
+                      <a:schemeClr val="bg1"/>
+                    </a:solidFill>
+                  </a:tcPr>
+                </a:tc>
+                <a:tc>
+                  <a:txBody>
+                    <a:bodyPr/>
+                    <a:lstStyle/>
+                    <a:p>
+                      <a:pPr algn="ctr"/>
+                      <a:r>
+                        <a:rPr lang="en-US" sz="1600" dirty="0"/>
+                        <a:t>105</a:t>
+                      </a:r>
+                    </a:p>
+                  </a:txBody>
+                  <a:tcPr>
+                    <a:solidFill>
+                      <a:schemeClr val="bg2">
+                        <a:lumMod val="75000"/>
+                      </a:schemeClr>
+                    </a:solidFill>
+                  </a:tcPr>
+                </a:tc>
+                <a:tc>
+                  <a:txBody>
+                    <a:bodyPr/>
+                    <a:lstStyle/>
+                    <a:p>
+                      <a:pPr algn="ctr"/>
+                      <a:r>
+                        <a:rPr lang="en-US" sz="1600" dirty="0"/>
+                        <a:t>0</a:t>
+                      </a:r>
+                    </a:p>
+                  </a:txBody>
+                  <a:tcPr>
+                    <a:solidFill>
+                      <a:schemeClr val="bg2"/>
+                    </a:solidFill>
+                  </a:tcPr>
+                </a:tc>
+                <a:extLst>
+                  <a:ext uri="{0D108BD9-81ED-4DB2-BD59-A6C34878D82A}">
+                    <a16:rowId xmlns:a16="http://schemas.microsoft.com/office/drawing/2014/main" val="3020103193"/>
+                  </a:ext>
+                </a:extLst>
+              </a:tr>
+              <a:tr h="697329">
+                <a:tc>
+                  <a:txBody>
+                    <a:bodyPr/>
+                    <a:lstStyle/>
+                    <a:p>
+                      <a:pPr marL="0" marR="0" lvl="0" indent="0" algn="ctr" defTabSz="914400" rtl="0" eaLnBrk="1" fontAlgn="auto" latinLnBrk="0" hangingPunct="1">
+                        <a:lnSpc>
+                          <a:spcPct val="100000"/>
+                        </a:lnSpc>
+                        <a:spcBef>
+                          <a:spcPts val="0"/>
+                        </a:spcBef>
+                        <a:spcAft>
+                          <a:spcPts val="0"/>
+                        </a:spcAft>
+                        <a:buClrTx/>
+                        <a:buSzTx/>
+                        <a:buFontTx/>
+                        <a:buNone/>
+                        <a:tabLst/>
+                        <a:defRPr/>
+                      </a:pPr>
+                      <a:r>
+                        <a:rPr lang="en-US" sz="1400" b="1" u="none" strike="noStrike" cap="none" dirty="0"/>
+                        <a:t>↓↓</a:t>
+                      </a:r>
+                    </a:p>
+                    <a:p>
+                      <a:pPr algn="ctr"/>
+                      <a:r>
+                        <a:rPr lang="en-US" sz="1400" dirty="0"/>
+                        <a:t>ASC vs.  SUB </a:t>
+                      </a:r>
+                    </a:p>
+                  </a:txBody>
+                  <a:tcPr>
+                    <a:solidFill>
+                      <a:schemeClr val="bg1"/>
+                    </a:solidFill>
+                  </a:tcPr>
+                </a:tc>
+                <a:tc>
+                  <a:txBody>
+                    <a:bodyPr/>
+                    <a:lstStyle/>
+                    <a:p>
+                      <a:pPr algn="ctr"/>
+                      <a:r>
+                        <a:rPr lang="en-US" sz="1600" dirty="0"/>
+                        <a:t>0</a:t>
+                      </a:r>
+                    </a:p>
+                  </a:txBody>
+                  <a:tcPr>
+                    <a:solidFill>
+                      <a:schemeClr val="bg2"/>
+                    </a:solidFill>
+                  </a:tcPr>
+                </a:tc>
+                <a:tc>
+                  <a:txBody>
+                    <a:bodyPr/>
+                    <a:lstStyle/>
+                    <a:p>
+                      <a:pPr algn="ctr"/>
+                      <a:r>
+                        <a:rPr lang="en-US" sz="1600" dirty="0"/>
+                        <a:t>73</a:t>
+                      </a:r>
+                    </a:p>
+                  </a:txBody>
+                  <a:tcPr>
+                    <a:solidFill>
+                      <a:schemeClr val="bg2">
+                        <a:lumMod val="75000"/>
+                      </a:schemeClr>
+                    </a:solidFill>
+                  </a:tcPr>
+                </a:tc>
+                <a:extLst>
+                  <a:ext uri="{0D108BD9-81ED-4DB2-BD59-A6C34878D82A}">
+                    <a16:rowId xmlns:a16="http://schemas.microsoft.com/office/drawing/2014/main" val="4254393338"/>
+                  </a:ext>
+                </a:extLst>
+              </a:tr>
+            </a:tbl>
+          </a:graphicData>
+        </a:graphic>
+      </p:graphicFrame>
+      <p:graphicFrame>
+        <p:nvGraphicFramePr>
+          <p:cNvPr id="14" name="Table 13">
+            <a:extLst>
+              <a:ext uri="{FF2B5EF4-FFF2-40B4-BE49-F238E27FC236}">
+                <a16:creationId xmlns:a16="http://schemas.microsoft.com/office/drawing/2014/main" id="{970A1E2D-4E4D-C1A8-9270-65ABC5FEB608}"/>
+              </a:ext>
+            </a:extLst>
+          </p:cNvPr>
+          <p:cNvGraphicFramePr>
+            <a:graphicFrameLocks noGrp="1"/>
+          </p:cNvGraphicFramePr>
+          <p:nvPr>
+            <p:extLst>
+              <p:ext uri="{D42A27DB-BD31-4B8C-83A1-F6EECF244321}">
+                <p14:modId xmlns:p14="http://schemas.microsoft.com/office/powerpoint/2010/main" val="2203052175"/>
+              </p:ext>
+            </p:extLst>
+          </p:nvPr>
+        </p:nvGraphicFramePr>
+        <p:xfrm>
+          <a:off x="7942867" y="3429000"/>
+          <a:ext cx="3118104" cy="2194560"/>
+        </p:xfrm>
+        <a:graphic>
+          <a:graphicData uri="http://schemas.openxmlformats.org/drawingml/2006/table">
+            <a:tbl>
+              <a:tblPr firstRow="1" bandRow="1">
+                <a:tableStyleId>{5940675A-B579-460E-94D1-54222C63F5DA}</a:tableStyleId>
+              </a:tblPr>
+              <a:tblGrid>
+                <a:gridCol w="1039368">
+                  <a:extLst>
+                    <a:ext uri="{9D8B030D-6E8A-4147-A177-3AD203B41FA5}">
+                      <a16:colId xmlns:a16="http://schemas.microsoft.com/office/drawing/2014/main" val="1018283342"/>
+                    </a:ext>
+                  </a:extLst>
+                </a:gridCol>
+                <a:gridCol w="1039368">
+                  <a:extLst>
+                    <a:ext uri="{9D8B030D-6E8A-4147-A177-3AD203B41FA5}">
+                      <a16:colId xmlns:a16="http://schemas.microsoft.com/office/drawing/2014/main" val="3793908051"/>
+                    </a:ext>
+                  </a:extLst>
+                </a:gridCol>
+                <a:gridCol w="1039368">
+                  <a:extLst>
+                    <a:ext uri="{9D8B030D-6E8A-4147-A177-3AD203B41FA5}">
+                      <a16:colId xmlns:a16="http://schemas.microsoft.com/office/drawing/2014/main" val="190768700"/>
+                    </a:ext>
+                  </a:extLst>
+                </a:gridCol>
+              </a:tblGrid>
+              <a:tr h="708463">
+                <a:tc>
+                  <a:txBody>
+                    <a:bodyPr/>
+                    <a:lstStyle/>
+                    <a:p>
+                      <a:pPr algn="ctr"/>
+                      <a:endParaRPr lang="en-US" sz="1400" dirty="0"/>
+                    </a:p>
+                  </a:txBody>
+                  <a:tcPr>
+                    <a:solidFill>
+                      <a:schemeClr val="bg1"/>
+                    </a:solidFill>
+                  </a:tcPr>
+                </a:tc>
+                <a:tc>
+                  <a:txBody>
+                    <a:bodyPr/>
+                    <a:lstStyle/>
+                    <a:p>
+                      <a:pPr marL="0" marR="0" lvl="0" indent="0" algn="ctr" defTabSz="914400" rtl="0" eaLnBrk="1" fontAlgn="auto" latinLnBrk="0" hangingPunct="1">
+                        <a:lnSpc>
+                          <a:spcPct val="100000"/>
+                        </a:lnSpc>
+                        <a:spcBef>
+                          <a:spcPts val="0"/>
+                        </a:spcBef>
+                        <a:spcAft>
+                          <a:spcPts val="0"/>
+                        </a:spcAft>
+                        <a:buClrTx/>
+                        <a:buSzTx/>
+                        <a:buFontTx/>
+                        <a:buNone/>
+                        <a:tabLst/>
+                        <a:defRPr/>
+                      </a:pPr>
+                      <a:r>
+                        <a:rPr lang="en-US" sz="1400" b="1" u="none" strike="noStrike" cap="none" dirty="0"/>
+                        <a:t>↑↑</a:t>
+                      </a:r>
+                    </a:p>
+                    <a:p>
+                      <a:pPr algn="ctr"/>
+                      <a:r>
+                        <a:rPr lang="en-US" sz="1400" dirty="0"/>
+                        <a:t>TRN vs. DOM </a:t>
+                      </a:r>
+                    </a:p>
+                  </a:txBody>
+                  <a:tcPr>
+                    <a:solidFill>
+                      <a:schemeClr val="bg1"/>
+                    </a:solidFill>
+                  </a:tcPr>
+                </a:tc>
+                <a:tc>
+                  <a:txBody>
+                    <a:bodyPr/>
+                    <a:lstStyle/>
+                    <a:p>
+                      <a:pPr marL="0" marR="0" lvl="0" indent="0" algn="ctr" defTabSz="914400" rtl="0" eaLnBrk="1" fontAlgn="auto" latinLnBrk="0" hangingPunct="1">
+                        <a:lnSpc>
+                          <a:spcPct val="100000"/>
+                        </a:lnSpc>
+                        <a:spcBef>
+                          <a:spcPts val="0"/>
+                        </a:spcBef>
+                        <a:spcAft>
+                          <a:spcPts val="0"/>
+                        </a:spcAft>
+                        <a:buClrTx/>
+                        <a:buSzTx/>
+                        <a:buFontTx/>
+                        <a:buNone/>
+                        <a:tabLst/>
+                        <a:defRPr/>
+                      </a:pPr>
+                      <a:r>
+                        <a:rPr lang="en-US" sz="1400" b="1" u="none" strike="noStrike" cap="none" dirty="0"/>
+                        <a:t>↓↓</a:t>
+                      </a:r>
+                    </a:p>
+                    <a:p>
+                      <a:pPr algn="ctr"/>
+                      <a:r>
+                        <a:rPr lang="en-US" sz="1400" dirty="0"/>
+                        <a:t>TRN vs. DOM </a:t>
+                      </a:r>
+                    </a:p>
+                  </a:txBody>
+                  <a:tcPr>
+                    <a:solidFill>
+                      <a:schemeClr val="bg2"/>
+                    </a:solidFill>
+                  </a:tcPr>
+                </a:tc>
+                <a:extLst>
+                  <a:ext uri="{0D108BD9-81ED-4DB2-BD59-A6C34878D82A}">
+                    <a16:rowId xmlns:a16="http://schemas.microsoft.com/office/drawing/2014/main" val="1408692954"/>
+                  </a:ext>
+                </a:extLst>
+              </a:tr>
+              <a:tr h="697329">
+                <a:tc>
+                  <a:txBody>
+                    <a:bodyPr/>
+                    <a:lstStyle/>
+                    <a:p>
+                      <a:pPr marL="0" marR="0" lvl="0" indent="0" algn="ctr" defTabSz="914400" rtl="0" eaLnBrk="1" fontAlgn="auto" latinLnBrk="0" hangingPunct="1">
+                        <a:lnSpc>
+                          <a:spcPct val="100000"/>
+                        </a:lnSpc>
+                        <a:spcBef>
+                          <a:spcPts val="0"/>
+                        </a:spcBef>
+                        <a:spcAft>
+                          <a:spcPts val="0"/>
+                        </a:spcAft>
+                        <a:buClrTx/>
+                        <a:buSzTx/>
+                        <a:buFontTx/>
+                        <a:buNone/>
+                        <a:tabLst/>
+                        <a:defRPr/>
+                      </a:pPr>
+                      <a:r>
+                        <a:rPr lang="en-US" sz="1400" b="1" u="none" strike="noStrike" cap="none" dirty="0"/>
+                        <a:t>↑↑</a:t>
+                      </a:r>
+                    </a:p>
+                    <a:p>
+                      <a:pPr algn="ctr"/>
+                      <a:r>
+                        <a:rPr lang="en-US" sz="1400" dirty="0"/>
+                        <a:t>TRN vs. SUB </a:t>
+                      </a:r>
+                    </a:p>
+                  </a:txBody>
+                  <a:tcPr>
+                    <a:solidFill>
+                      <a:schemeClr val="bg1"/>
+                    </a:solidFill>
+                  </a:tcPr>
+                </a:tc>
+                <a:tc>
+                  <a:txBody>
+                    <a:bodyPr/>
+                    <a:lstStyle/>
+                    <a:p>
+                      <a:pPr algn="ctr"/>
+                      <a:r>
+                        <a:rPr lang="en-US" sz="1600" dirty="0"/>
+                        <a:t>5</a:t>
+                      </a:r>
+                    </a:p>
+                  </a:txBody>
+                  <a:tcPr>
+                    <a:solidFill>
+                      <a:schemeClr val="bg2">
+                        <a:lumMod val="75000"/>
+                      </a:schemeClr>
+                    </a:solidFill>
+                  </a:tcPr>
+                </a:tc>
+                <a:tc>
+                  <a:txBody>
+                    <a:bodyPr/>
+                    <a:lstStyle/>
+                    <a:p>
+                      <a:pPr algn="ctr"/>
+                      <a:r>
+                        <a:rPr lang="en-US" sz="1600" dirty="0"/>
+                        <a:t>0</a:t>
+                      </a:r>
+                    </a:p>
+                  </a:txBody>
+                  <a:tcPr>
+                    <a:solidFill>
+                      <a:schemeClr val="bg2"/>
+                    </a:solidFill>
+                  </a:tcPr>
+                </a:tc>
+                <a:extLst>
+                  <a:ext uri="{0D108BD9-81ED-4DB2-BD59-A6C34878D82A}">
+                    <a16:rowId xmlns:a16="http://schemas.microsoft.com/office/drawing/2014/main" val="3020103193"/>
+                  </a:ext>
+                </a:extLst>
+              </a:tr>
+              <a:tr h="697329">
+                <a:tc>
+                  <a:txBody>
+                    <a:bodyPr/>
+                    <a:lstStyle/>
+                    <a:p>
+                      <a:pPr marL="0" marR="0" lvl="0" indent="0" algn="ctr" defTabSz="914400" rtl="0" eaLnBrk="1" fontAlgn="auto" latinLnBrk="0" hangingPunct="1">
+                        <a:lnSpc>
+                          <a:spcPct val="100000"/>
+                        </a:lnSpc>
+                        <a:spcBef>
+                          <a:spcPts val="0"/>
+                        </a:spcBef>
+                        <a:spcAft>
+                          <a:spcPts val="0"/>
+                        </a:spcAft>
+                        <a:buClrTx/>
+                        <a:buSzTx/>
+                        <a:buFontTx/>
+                        <a:buNone/>
+                        <a:tabLst/>
+                        <a:defRPr/>
+                      </a:pPr>
+                      <a:r>
+                        <a:rPr lang="en-US" sz="1400" b="1" u="none" strike="noStrike" cap="none" dirty="0"/>
+                        <a:t>↓↓</a:t>
+                      </a:r>
+                    </a:p>
+                    <a:p>
+                      <a:pPr algn="ctr"/>
+                      <a:r>
+                        <a:rPr lang="en-US" sz="1400" dirty="0"/>
+                        <a:t>TRN vs. SUB</a:t>
+                      </a:r>
+                    </a:p>
+                  </a:txBody>
+                  <a:tcPr>
+                    <a:solidFill>
+                      <a:schemeClr val="bg1"/>
+                    </a:solidFill>
+                  </a:tcPr>
+                </a:tc>
+                <a:tc>
+                  <a:txBody>
+                    <a:bodyPr/>
+                    <a:lstStyle/>
+                    <a:p>
+                      <a:pPr algn="ctr"/>
+                      <a:r>
+                        <a:rPr lang="en-US" sz="1600" dirty="0"/>
+                        <a:t>0</a:t>
+                      </a:r>
+                    </a:p>
+                  </a:txBody>
+                  <a:tcPr>
+                    <a:solidFill>
+                      <a:schemeClr val="bg2"/>
+                    </a:solidFill>
+                  </a:tcPr>
+                </a:tc>
+                <a:tc>
+                  <a:txBody>
+                    <a:bodyPr/>
+                    <a:lstStyle/>
+                    <a:p>
+                      <a:pPr algn="ctr"/>
+                      <a:r>
+                        <a:rPr lang="en-US" sz="1600" dirty="0"/>
+                        <a:t>5</a:t>
+                      </a:r>
+                    </a:p>
+                  </a:txBody>
+                  <a:tcPr>
+                    <a:solidFill>
+                      <a:schemeClr val="bg2">
+                        <a:lumMod val="75000"/>
+                      </a:schemeClr>
+                    </a:solidFill>
+                  </a:tcPr>
+                </a:tc>
+                <a:extLst>
+                  <a:ext uri="{0D108BD9-81ED-4DB2-BD59-A6C34878D82A}">
+                    <a16:rowId xmlns:a16="http://schemas.microsoft.com/office/drawing/2014/main" val="4254393338"/>
+                  </a:ext>
+                </a:extLst>
+              </a:tr>
+            </a:tbl>
+          </a:graphicData>
+        </a:graphic>
+      </p:graphicFrame>
+      <p:sp>
+        <p:nvSpPr>
+          <p:cNvPr id="15" name="TextBox 14">
+            <a:extLst>
+              <a:ext uri="{FF2B5EF4-FFF2-40B4-BE49-F238E27FC236}">
+                <a16:creationId xmlns:a16="http://schemas.microsoft.com/office/drawing/2014/main" id="{64A3A719-E98A-4504-9C18-AC10B2A9FA85}"/>
+              </a:ext>
+            </a:extLst>
+          </p:cNvPr>
+          <p:cNvSpPr txBox="1"/>
+          <p:nvPr/>
+        </p:nvSpPr>
+        <p:spPr>
+          <a:xfrm>
+            <a:off x="704297" y="3747027"/>
+            <a:ext cx="492443" cy="1558506"/>
+          </a:xfrm>
+          <a:prstGeom prst="rect">
+            <a:avLst/>
+          </a:prstGeom>
+          <a:noFill/>
+        </p:spPr>
+        <p:txBody>
+          <a:bodyPr vert="vert270" wrap="square" rtlCol="0">
+            <a:spAutoFit/>
+          </a:bodyPr>
+          <a:lstStyle/>
+          <a:p>
+            <a:pPr algn="ctr"/>
+            <a:r>
+              <a:rPr lang="en-US" sz="2000" b="1" dirty="0"/>
+              <a:t>25 hours </a:t>
+            </a:r>
+          </a:p>
+        </p:txBody>
+      </p:sp>
+      <p:sp>
+        <p:nvSpPr>
+          <p:cNvPr id="33" name="TextBox 32">
+            <a:extLst>
+              <a:ext uri="{FF2B5EF4-FFF2-40B4-BE49-F238E27FC236}">
+                <a16:creationId xmlns:a16="http://schemas.microsoft.com/office/drawing/2014/main" id="{04D538CE-BC48-F4C6-3D31-735F2ED2AE07}"/>
+              </a:ext>
+            </a:extLst>
+          </p:cNvPr>
+          <p:cNvSpPr txBox="1"/>
+          <p:nvPr/>
+        </p:nvSpPr>
+        <p:spPr>
+          <a:xfrm>
+            <a:off x="8305722" y="484144"/>
+            <a:ext cx="2392393" cy="400110"/>
+          </a:xfrm>
+          <a:prstGeom prst="rect">
+            <a:avLst/>
+          </a:prstGeom>
+          <a:noFill/>
+        </p:spPr>
+        <p:txBody>
+          <a:bodyPr wrap="square" rtlCol="0">
+            <a:spAutoFit/>
+          </a:bodyPr>
+          <a:lstStyle/>
+          <a:p>
+            <a:pPr algn="ctr"/>
+            <a:r>
+              <a:rPr lang="en-US" sz="2000" b="1" dirty="0"/>
+              <a:t>Transition Genes</a:t>
+            </a:r>
+          </a:p>
+        </p:txBody>
+      </p:sp>
+      <p:sp>
+        <p:nvSpPr>
+          <p:cNvPr id="2" name="TextBox 1">
+            <a:extLst>
+              <a:ext uri="{FF2B5EF4-FFF2-40B4-BE49-F238E27FC236}">
+                <a16:creationId xmlns:a16="http://schemas.microsoft.com/office/drawing/2014/main" id="{60B70F63-9CEC-19BA-0CAE-3B97184798BD}"/>
+              </a:ext>
+            </a:extLst>
+          </p:cNvPr>
+          <p:cNvSpPr txBox="1"/>
+          <p:nvPr/>
+        </p:nvSpPr>
+        <p:spPr>
+          <a:xfrm>
+            <a:off x="1621494" y="484144"/>
+            <a:ext cx="2392393" cy="400110"/>
+          </a:xfrm>
+          <a:prstGeom prst="rect">
+            <a:avLst/>
+          </a:prstGeom>
+          <a:noFill/>
+        </p:spPr>
+        <p:txBody>
+          <a:bodyPr wrap="square" rtlCol="0">
+            <a:spAutoFit/>
+          </a:bodyPr>
+          <a:lstStyle/>
+          <a:p>
+            <a:pPr algn="ctr"/>
+            <a:r>
+              <a:rPr lang="en-US" sz="2000" b="1" dirty="0"/>
+              <a:t>TRN vs. DOM</a:t>
+            </a:r>
+          </a:p>
+        </p:txBody>
+      </p:sp>
+      <p:sp>
+        <p:nvSpPr>
+          <p:cNvPr id="3" name="TextBox 2">
+            <a:extLst>
+              <a:ext uri="{FF2B5EF4-FFF2-40B4-BE49-F238E27FC236}">
+                <a16:creationId xmlns:a16="http://schemas.microsoft.com/office/drawing/2014/main" id="{50C90845-3A6B-0CF9-C868-2D606D50F2E6}"/>
+              </a:ext>
+            </a:extLst>
+          </p:cNvPr>
+          <p:cNvSpPr txBox="1"/>
+          <p:nvPr/>
+        </p:nvSpPr>
+        <p:spPr>
+          <a:xfrm>
+            <a:off x="4899803" y="490048"/>
+            <a:ext cx="2392393" cy="400110"/>
+          </a:xfrm>
+          <a:prstGeom prst="rect">
+            <a:avLst/>
+          </a:prstGeom>
+          <a:noFill/>
+        </p:spPr>
+        <p:txBody>
+          <a:bodyPr wrap="square" rtlCol="0">
+            <a:spAutoFit/>
+          </a:bodyPr>
+          <a:lstStyle/>
+          <a:p>
+            <a:pPr algn="ctr"/>
+            <a:r>
+              <a:rPr lang="en-US" sz="2000" b="1" dirty="0"/>
+              <a:t>TRN vs. SUB</a:t>
+            </a:r>
+          </a:p>
+        </p:txBody>
+      </p:sp>
+    </p:spTree>
+    <p:extLst>
+      <p:ext uri="{BB962C8B-B14F-4D97-AF65-F5344CB8AC3E}">
+        <p14:creationId xmlns:p14="http://schemas.microsoft.com/office/powerpoint/2010/main" val="3029619570"/>
+      </p:ext>
+    </p:extLst>
+  </p:cSld>
+  <p:clrMapOvr>
+    <a:masterClrMapping/>
+  </p:clrMapOvr>
+</p:sld>
+</file>
+
+<file path=ppt/slides/slide4.xml><?xml version="1.0" encoding="utf-8"?>
+<p:sld xmlns:a="http://schemas.openxmlformats.org/drawingml/2006/main" xmlns:r="http://schemas.openxmlformats.org/officeDocument/2006/relationships" xmlns:p="http://schemas.openxmlformats.org/presentationml/2006/main">
+  <p:cSld>
+    <p:spTree>
+      <p:nvGrpSpPr>
+        <p:cNvPr id="1" name=""/>
+        <p:cNvGrpSpPr/>
+        <p:nvPr/>
+      </p:nvGrpSpPr>
+      <p:grpSpPr>
+        <a:xfrm>
+          <a:off x="0" y="0"/>
+          <a:ext cx="0" cy="0"/>
+          <a:chOff x="0" y="0"/>
+          <a:chExt cx="0" cy="0"/>
+        </a:xfrm>
+      </p:grpSpPr>
+      <p:graphicFrame>
+        <p:nvGraphicFramePr>
+          <p:cNvPr id="4" name="Table 3">
+            <a:extLst>
+              <a:ext uri="{FF2B5EF4-FFF2-40B4-BE49-F238E27FC236}">
+                <a16:creationId xmlns:a16="http://schemas.microsoft.com/office/drawing/2014/main" id="{3A159B57-23BD-9E18-9098-D28C3567E37D}"/>
+              </a:ext>
+            </a:extLst>
+          </p:cNvPr>
+          <p:cNvGraphicFramePr>
+            <a:graphicFrameLocks noGrp="1"/>
+          </p:cNvGraphicFramePr>
+          <p:nvPr>
+            <p:extLst>
+              <p:ext uri="{D42A27DB-BD31-4B8C-83A1-F6EECF244321}">
                 <p14:modId xmlns:p14="http://schemas.microsoft.com/office/powerpoint/2010/main" val="3723520376"/>
               </p:ext>
             </p:extLst>
@@ -22030,7 +24679,7 @@
 </p:sld>
 </file>
 
-<file path=ppt/slides/slide4.xml><?xml version="1.0" encoding="utf-8"?>
+<file path=ppt/slides/slide5.xml><?xml version="1.0" encoding="utf-8"?>
 <p:sld xmlns:a="http://schemas.openxmlformats.org/drawingml/2006/main" xmlns:r="http://schemas.openxmlformats.org/officeDocument/2006/relationships" xmlns:p="http://schemas.openxmlformats.org/presentationml/2006/main">
   <p:cSld>
     <p:spTree>
@@ -22153,7 +24802,7 @@
 </p:sld>
 </file>
 
-<file path=ppt/slides/slide5.xml><?xml version="1.0" encoding="utf-8"?>
+<file path=ppt/slides/slide6.xml><?xml version="1.0" encoding="utf-8"?>
 <p:sld xmlns:a="http://schemas.openxmlformats.org/drawingml/2006/main" xmlns:r="http://schemas.openxmlformats.org/officeDocument/2006/relationships" xmlns:p="http://schemas.openxmlformats.org/presentationml/2006/main">
   <p:cSld>
     <p:spTree>
@@ -26185,7 +28834,7 @@
 </p:sld>
 </file>
 
-<file path=ppt/slides/slide6.xml><?xml version="1.0" encoding="utf-8"?>
+<file path=ppt/slides/slide7.xml><?xml version="1.0" encoding="utf-8"?>
 <p:sld xmlns:a="http://schemas.openxmlformats.org/drawingml/2006/main" xmlns:r="http://schemas.openxmlformats.org/officeDocument/2006/relationships" xmlns:p="http://schemas.openxmlformats.org/presentationml/2006/main">
   <p:cSld>
     <p:spTree>
@@ -26526,7 +29175,7 @@
 </p:sld>
 </file>
 
-<file path=ppt/slides/slide7.xml><?xml version="1.0" encoding="utf-8"?>
+<file path=ppt/slides/slide8.xml><?xml version="1.0" encoding="utf-8"?>
 <p:sld xmlns:a="http://schemas.openxmlformats.org/drawingml/2006/main" xmlns:r="http://schemas.openxmlformats.org/officeDocument/2006/relationships" xmlns:p="http://schemas.openxmlformats.org/presentationml/2006/main">
   <p:cSld>
     <p:spTree>
@@ -26676,7 +29325,7 @@
 </p:sld>
 </file>
 
-<file path=ppt/slides/slide8.xml><?xml version="1.0" encoding="utf-8"?>
+<file path=ppt/slides/slide9.xml><?xml version="1.0" encoding="utf-8"?>
 <p:sld xmlns:a="http://schemas.openxmlformats.org/drawingml/2006/main" xmlns:r="http://schemas.openxmlformats.org/officeDocument/2006/relationships" xmlns:p="http://schemas.openxmlformats.org/presentationml/2006/main">
   <p:cSld>
     <p:spTree>
@@ -26772,156 +29421,6 @@
     <p:extLst>
       <p:ext uri="{BB962C8B-B14F-4D97-AF65-F5344CB8AC3E}">
         <p14:creationId xmlns:p14="http://schemas.microsoft.com/office/powerpoint/2010/main" val="1820371378"/>
-      </p:ext>
-    </p:extLst>
-  </p:cSld>
-  <p:clrMapOvr>
-    <a:masterClrMapping/>
-  </p:clrMapOvr>
-</p:sld>
-</file>
-
-<file path=ppt/slides/slide9.xml><?xml version="1.0" encoding="utf-8"?>
-<p:sld xmlns:a="http://schemas.openxmlformats.org/drawingml/2006/main" xmlns:r="http://schemas.openxmlformats.org/officeDocument/2006/relationships" xmlns:p="http://schemas.openxmlformats.org/presentationml/2006/main">
-  <p:cSld>
-    <p:spTree>
-      <p:nvGrpSpPr>
-        <p:cNvPr id="1" name=""/>
-        <p:cNvGrpSpPr/>
-        <p:nvPr/>
-      </p:nvGrpSpPr>
-      <p:grpSpPr>
-        <a:xfrm>
-          <a:off x="0" y="0"/>
-          <a:ext cx="0" cy="0"/>
-          <a:chOff x="0" y="0"/>
-          <a:chExt cx="0" cy="0"/>
-        </a:xfrm>
-      </p:grpSpPr>
-      <p:pic>
-        <p:nvPicPr>
-          <p:cNvPr id="5" name="Picture 4">
-            <a:extLst>
-              <a:ext uri="{FF2B5EF4-FFF2-40B4-BE49-F238E27FC236}">
-                <a16:creationId xmlns:a16="http://schemas.microsoft.com/office/drawing/2014/main" id="{5C3CDE7C-D47B-54FB-1B5C-90EA54328053}"/>
-              </a:ext>
-            </a:extLst>
-          </p:cNvPr>
-          <p:cNvPicPr>
-            <a:picLocks noChangeAspect="1"/>
-          </p:cNvPicPr>
-          <p:nvPr/>
-        </p:nvPicPr>
-        <p:blipFill>
-          <a:blip r:embed="rId2"/>
-          <a:stretch>
-            <a:fillRect/>
-          </a:stretch>
-        </p:blipFill>
-        <p:spPr>
-          <a:xfrm>
-            <a:off x="158679" y="166952"/>
-            <a:ext cx="5724825" cy="2806286"/>
-          </a:xfrm>
-          <a:prstGeom prst="rect">
-            <a:avLst/>
-          </a:prstGeom>
-        </p:spPr>
-      </p:pic>
-      <p:pic>
-        <p:nvPicPr>
-          <p:cNvPr id="7" name="Picture 6">
-            <a:extLst>
-              <a:ext uri="{FF2B5EF4-FFF2-40B4-BE49-F238E27FC236}">
-                <a16:creationId xmlns:a16="http://schemas.microsoft.com/office/drawing/2014/main" id="{17F23580-988C-B076-F2FF-DC427D64F60C}"/>
-              </a:ext>
-            </a:extLst>
-          </p:cNvPr>
-          <p:cNvPicPr>
-            <a:picLocks noChangeAspect="1"/>
-          </p:cNvPicPr>
-          <p:nvPr/>
-        </p:nvPicPr>
-        <p:blipFill>
-          <a:blip r:embed="rId3"/>
-          <a:stretch>
-            <a:fillRect/>
-          </a:stretch>
-        </p:blipFill>
-        <p:spPr>
-          <a:xfrm>
-            <a:off x="6026989" y="17596"/>
-            <a:ext cx="5641675" cy="3006291"/>
-          </a:xfrm>
-          <a:prstGeom prst="rect">
-            <a:avLst/>
-          </a:prstGeom>
-        </p:spPr>
-      </p:pic>
-      <p:pic>
-        <p:nvPicPr>
-          <p:cNvPr id="9" name="Picture 8">
-            <a:extLst>
-              <a:ext uri="{FF2B5EF4-FFF2-40B4-BE49-F238E27FC236}">
-                <a16:creationId xmlns:a16="http://schemas.microsoft.com/office/drawing/2014/main" id="{7438ED5C-A187-EAC5-8886-3D6890D2ED96}"/>
-              </a:ext>
-            </a:extLst>
-          </p:cNvPr>
-          <p:cNvPicPr>
-            <a:picLocks noChangeAspect="1"/>
-          </p:cNvPicPr>
-          <p:nvPr/>
-        </p:nvPicPr>
-        <p:blipFill>
-          <a:blip r:embed="rId4"/>
-          <a:stretch>
-            <a:fillRect/>
-          </a:stretch>
-        </p:blipFill>
-        <p:spPr>
-          <a:xfrm>
-            <a:off x="196310" y="3429000"/>
-            <a:ext cx="5899690" cy="3059778"/>
-          </a:xfrm>
-          <a:prstGeom prst="rect">
-            <a:avLst/>
-          </a:prstGeom>
-        </p:spPr>
-      </p:pic>
-      <p:pic>
-        <p:nvPicPr>
-          <p:cNvPr id="11" name="Picture 10">
-            <a:extLst>
-              <a:ext uri="{FF2B5EF4-FFF2-40B4-BE49-F238E27FC236}">
-                <a16:creationId xmlns:a16="http://schemas.microsoft.com/office/drawing/2014/main" id="{83D7B5EF-3D30-6F03-B81B-1D055089C2F4}"/>
-              </a:ext>
-            </a:extLst>
-          </p:cNvPr>
-          <p:cNvPicPr>
-            <a:picLocks noChangeAspect="1"/>
-          </p:cNvPicPr>
-          <p:nvPr/>
-        </p:nvPicPr>
-        <p:blipFill>
-          <a:blip r:embed="rId5"/>
-          <a:stretch>
-            <a:fillRect/>
-          </a:stretch>
-        </p:blipFill>
-        <p:spPr>
-          <a:xfrm>
-            <a:off x="6121233" y="3582928"/>
-            <a:ext cx="5453185" cy="2905850"/>
-          </a:xfrm>
-          <a:prstGeom prst="rect">
-            <a:avLst/>
-          </a:prstGeom>
-        </p:spPr>
-      </p:pic>
-    </p:spTree>
-    <p:extLst>
-      <p:ext uri="{BB962C8B-B14F-4D97-AF65-F5344CB8AC3E}">
-        <p14:creationId xmlns:p14="http://schemas.microsoft.com/office/powerpoint/2010/main" val="2116087111"/>
       </p:ext>
     </p:extLst>
   </p:cSld>

</xml_diff>

<commit_message>
WGCNA for 70 min redo
</commit_message>
<xml_diff>
--- a/manuscript/manuscript_figures/mPFC_manuscript_figures.pptx
+++ b/manuscript/manuscript_figures/mPFC_manuscript_figures.pptx
@@ -131,7 +131,7 @@
   <pc:docChgLst>
     <pc:chgData name="Tyler Milewski" userId="d8a66fee8314b92f" providerId="LiveId" clId="{C84B92C0-0BEA-4C39-9B74-17E8D7BEDFB3}"/>
     <pc:docChg chg="undo redo custSel addSld delSld modSld sldOrd">
-      <pc:chgData name="Tyler Milewski" userId="d8a66fee8314b92f" providerId="LiveId" clId="{C84B92C0-0BEA-4C39-9B74-17E8D7BEDFB3}" dt="2023-12-16T17:43:08.175" v="1904" actId="478"/>
+      <pc:chgData name="Tyler Milewski" userId="d8a66fee8314b92f" providerId="LiveId" clId="{C84B92C0-0BEA-4C39-9B74-17E8D7BEDFB3}" dt="2023-12-16T22:13:29.850" v="1909" actId="680"/>
       <pc:docMkLst>
         <pc:docMk/>
       </pc:docMkLst>
@@ -2247,7 +2247,7 @@
         </pc:graphicFrameChg>
       </pc:sldChg>
       <pc:sldChg chg="addSp delSp modSp new mod">
-        <pc:chgData name="Tyler Milewski" userId="d8a66fee8314b92f" providerId="LiveId" clId="{C84B92C0-0BEA-4C39-9B74-17E8D7BEDFB3}" dt="2023-12-16T17:43:08.175" v="1904" actId="478"/>
+        <pc:chgData name="Tyler Milewski" userId="d8a66fee8314b92f" providerId="LiveId" clId="{C84B92C0-0BEA-4C39-9B74-17E8D7BEDFB3}" dt="2023-12-16T22:13:19.509" v="1907" actId="478"/>
         <pc:sldMkLst>
           <pc:docMk/>
           <pc:sldMk cId="3708415234" sldId="267"/>
@@ -2269,6 +2269,14 @@
           </ac:spMkLst>
         </pc:spChg>
         <pc:picChg chg="add del mod">
+          <ac:chgData name="Tyler Milewski" userId="d8a66fee8314b92f" providerId="LiveId" clId="{C84B92C0-0BEA-4C39-9B74-17E8D7BEDFB3}" dt="2023-12-16T22:13:19.509" v="1907" actId="478"/>
+          <ac:picMkLst>
+            <pc:docMk/>
+            <pc:sldMk cId="3708415234" sldId="267"/>
+            <ac:picMk id="3" creationId="{AF23620C-0E20-A993-EA23-A584F35F2A52}"/>
+          </ac:picMkLst>
+        </pc:picChg>
+        <pc:picChg chg="add del mod">
           <ac:chgData name="Tyler Milewski" userId="d8a66fee8314b92f" providerId="LiveId" clId="{C84B92C0-0BEA-4C39-9B74-17E8D7BEDFB3}" dt="2023-12-16T17:43:08.175" v="1904" actId="478"/>
           <ac:picMkLst>
             <pc:docMk/>
@@ -2276,6 +2284,13 @@
             <ac:picMk id="4" creationId="{D7D9E03F-4C0F-A501-21D7-8F22D2ED3EEC}"/>
           </ac:picMkLst>
         </pc:picChg>
+      </pc:sldChg>
+      <pc:sldChg chg="new del">
+        <pc:chgData name="Tyler Milewski" userId="d8a66fee8314b92f" providerId="LiveId" clId="{C84B92C0-0BEA-4C39-9B74-17E8D7BEDFB3}" dt="2023-12-16T22:13:29.850" v="1909" actId="680"/>
+        <pc:sldMkLst>
+          <pc:docMk/>
+          <pc:sldMk cId="2349976230" sldId="268"/>
+        </pc:sldMkLst>
       </pc:sldChg>
     </pc:docChg>
   </pc:docChgLst>

</xml_diff>